<commit_message>
why didnt these go through
</commit_message>
<xml_diff>
--- a/coordinate_frames.pptx
+++ b/coordinate_frames.pptx
@@ -7,14 +7,14 @@
   <p:sldIdLst>
     <p:sldId id="256" r:id="rId2"/>
   </p:sldIdLst>
-  <p:sldSz cx="9144000" cy="4572000"/>
+  <p:sldSz cx="13716000" cy="9144000"/>
   <p:notesSz cx="6858000" cy="9144000"/>
   <p:defaultTextStyle>
     <a:defPPr>
       <a:defRPr lang="en-US"/>
     </a:defPPr>
-    <a:lvl1pPr marL="0" algn="l" defTabSz="2194341" rtl="0" eaLnBrk="1" latinLnBrk="0" hangingPunct="1">
-      <a:defRPr sz="4200" kern="1200">
+    <a:lvl1pPr marL="0" algn="l" defTabSz="3657089" rtl="0" eaLnBrk="1" latinLnBrk="0" hangingPunct="1">
+      <a:defRPr sz="7000" kern="1200">
         <a:solidFill>
           <a:schemeClr val="tx1"/>
         </a:solidFill>
@@ -23,8 +23,8 @@
         <a:cs typeface="+mn-cs"/>
       </a:defRPr>
     </a:lvl1pPr>
-    <a:lvl2pPr marL="1097172" algn="l" defTabSz="2194341" rtl="0" eaLnBrk="1" latinLnBrk="0" hangingPunct="1">
-      <a:defRPr sz="4200" kern="1200">
+    <a:lvl2pPr marL="1828547" algn="l" defTabSz="3657089" rtl="0" eaLnBrk="1" latinLnBrk="0" hangingPunct="1">
+      <a:defRPr sz="7000" kern="1200">
         <a:solidFill>
           <a:schemeClr val="tx1"/>
         </a:solidFill>
@@ -33,8 +33,8 @@
         <a:cs typeface="+mn-cs"/>
       </a:defRPr>
     </a:lvl2pPr>
-    <a:lvl3pPr marL="2194341" algn="l" defTabSz="2194341" rtl="0" eaLnBrk="1" latinLnBrk="0" hangingPunct="1">
-      <a:defRPr sz="4200" kern="1200">
+    <a:lvl3pPr marL="3657089" algn="l" defTabSz="3657089" rtl="0" eaLnBrk="1" latinLnBrk="0" hangingPunct="1">
+      <a:defRPr sz="7000" kern="1200">
         <a:solidFill>
           <a:schemeClr val="tx1"/>
         </a:solidFill>
@@ -43,8 +43,8 @@
         <a:cs typeface="+mn-cs"/>
       </a:defRPr>
     </a:lvl3pPr>
-    <a:lvl4pPr marL="3291513" algn="l" defTabSz="2194341" rtl="0" eaLnBrk="1" latinLnBrk="0" hangingPunct="1">
-      <a:defRPr sz="4200" kern="1200">
+    <a:lvl4pPr marL="5485636" algn="l" defTabSz="3657089" rtl="0" eaLnBrk="1" latinLnBrk="0" hangingPunct="1">
+      <a:defRPr sz="7000" kern="1200">
         <a:solidFill>
           <a:schemeClr val="tx1"/>
         </a:solidFill>
@@ -53,8 +53,8 @@
         <a:cs typeface="+mn-cs"/>
       </a:defRPr>
     </a:lvl4pPr>
-    <a:lvl5pPr marL="4388682" algn="l" defTabSz="2194341" rtl="0" eaLnBrk="1" latinLnBrk="0" hangingPunct="1">
-      <a:defRPr sz="4200" kern="1200">
+    <a:lvl5pPr marL="7314177" algn="l" defTabSz="3657089" rtl="0" eaLnBrk="1" latinLnBrk="0" hangingPunct="1">
+      <a:defRPr sz="7000" kern="1200">
         <a:solidFill>
           <a:schemeClr val="tx1"/>
         </a:solidFill>
@@ -63,8 +63,8 @@
         <a:cs typeface="+mn-cs"/>
       </a:defRPr>
     </a:lvl5pPr>
-    <a:lvl6pPr marL="5485854" algn="l" defTabSz="2194341" rtl="0" eaLnBrk="1" latinLnBrk="0" hangingPunct="1">
-      <a:defRPr sz="4200" kern="1200">
+    <a:lvl6pPr marL="9142724" algn="l" defTabSz="3657089" rtl="0" eaLnBrk="1" latinLnBrk="0" hangingPunct="1">
+      <a:defRPr sz="7000" kern="1200">
         <a:solidFill>
           <a:schemeClr val="tx1"/>
         </a:solidFill>
@@ -73,8 +73,8 @@
         <a:cs typeface="+mn-cs"/>
       </a:defRPr>
     </a:lvl6pPr>
-    <a:lvl7pPr marL="6583020" algn="l" defTabSz="2194341" rtl="0" eaLnBrk="1" latinLnBrk="0" hangingPunct="1">
-      <a:defRPr sz="4200" kern="1200">
+    <a:lvl7pPr marL="10971261" algn="l" defTabSz="3657089" rtl="0" eaLnBrk="1" latinLnBrk="0" hangingPunct="1">
+      <a:defRPr sz="7000" kern="1200">
         <a:solidFill>
           <a:schemeClr val="tx1"/>
         </a:solidFill>
@@ -83,8 +83,8 @@
         <a:cs typeface="+mn-cs"/>
       </a:defRPr>
     </a:lvl7pPr>
-    <a:lvl8pPr marL="7680192" algn="l" defTabSz="2194341" rtl="0" eaLnBrk="1" latinLnBrk="0" hangingPunct="1">
-      <a:defRPr sz="4200" kern="1200">
+    <a:lvl8pPr marL="12799808" algn="l" defTabSz="3657089" rtl="0" eaLnBrk="1" latinLnBrk="0" hangingPunct="1">
+      <a:defRPr sz="7000" kern="1200">
         <a:solidFill>
           <a:schemeClr val="tx1"/>
         </a:solidFill>
@@ -93,8 +93,8 @@
         <a:cs typeface="+mn-cs"/>
       </a:defRPr>
     </a:lvl8pPr>
-    <a:lvl9pPr marL="8777361" algn="l" defTabSz="2194341" rtl="0" eaLnBrk="1" latinLnBrk="0" hangingPunct="1">
-      <a:defRPr sz="4200" kern="1200">
+    <a:lvl9pPr marL="14628350" algn="l" defTabSz="3657089" rtl="0" eaLnBrk="1" latinLnBrk="0" hangingPunct="1">
+      <a:defRPr sz="7000" kern="1200">
         <a:solidFill>
           <a:schemeClr val="tx1"/>
         </a:solidFill>
@@ -106,13 +106,23 @@
   </p:defaultTextStyle>
   <p:extLst>
     <p:ext uri="{EFAFB233-063F-42B5-8137-9DF3F51BA10A}">
-      <p15:sldGuideLst xmlns:p15="http://schemas.microsoft.com/office/powerpoint/2012/main" xmlns="">
-        <p15:guide id="1" orient="horz" pos="576">
+      <p15:sldGuideLst xmlns:p15="http://schemas.microsoft.com/office/powerpoint/2012/main">
+        <p15:guide id="1" orient="horz" pos="1152" userDrawn="1">
           <p15:clr>
             <a:srgbClr val="A4A3A4"/>
           </p15:clr>
         </p15:guide>
-        <p15:guide id="2" pos="864">
+        <p15:guide id="2" pos="1296" userDrawn="1">
+          <p15:clr>
+            <a:srgbClr val="A4A3A4"/>
+          </p15:clr>
+        </p15:guide>
+        <p15:guide id="3" orient="horz" pos="2880" userDrawn="1">
+          <p15:clr>
+            <a:srgbClr val="A4A3A4"/>
+          </p15:clr>
+        </p15:guide>
+        <p15:guide id="4" pos="4320" userDrawn="1">
           <p15:clr>
             <a:srgbClr val="A4A3A4"/>
           </p15:clr>
@@ -152,8 +162,8 @@
         </p:nvSpPr>
         <p:spPr>
           <a:xfrm>
-            <a:off x="685800" y="1420289"/>
-            <a:ext cx="7772400" cy="980018"/>
+            <a:off x="1028700" y="2840578"/>
+            <a:ext cx="11658600" cy="1960036"/>
           </a:xfrm>
         </p:spPr>
         <p:txBody>
@@ -180,8 +190,8 @@
         </p:nvSpPr>
         <p:spPr>
           <a:xfrm>
-            <a:off x="1371600" y="2590800"/>
-            <a:ext cx="6400800" cy="1168400"/>
+            <a:off x="2057400" y="5181600"/>
+            <a:ext cx="9601200" cy="2336800"/>
           </a:xfrm>
         </p:spPr>
         <p:txBody>
@@ -304,7 +314,7 @@
           <a:p>
             <a:fld id="{5064B7A2-D91B-45A0-9A08-FA3D47D35952}" type="datetimeFigureOut">
               <a:rPr lang="en-US" smtClean="0"/>
-              <a:t>4/7/2015</a:t>
+              <a:t>4/27/2015</a:t>
             </a:fld>
             <a:endParaRPr lang="en-US"/>
           </a:p>
@@ -474,7 +484,7 @@
           <a:p>
             <a:fld id="{5064B7A2-D91B-45A0-9A08-FA3D47D35952}" type="datetimeFigureOut">
               <a:rPr lang="en-US" smtClean="0"/>
-              <a:t>4/7/2015</a:t>
+              <a:t>4/27/2015</a:t>
             </a:fld>
             <a:endParaRPr lang="en-US"/>
           </a:p>
@@ -564,8 +574,8 @@
         </p:nvSpPr>
         <p:spPr>
           <a:xfrm>
-            <a:off x="6629400" y="183099"/>
-            <a:ext cx="2057400" cy="3901018"/>
+            <a:off x="9944100" y="366198"/>
+            <a:ext cx="3086100" cy="7802036"/>
           </a:xfrm>
         </p:spPr>
         <p:txBody>
@@ -592,8 +602,8 @@
         </p:nvSpPr>
         <p:spPr>
           <a:xfrm>
-            <a:off x="457200" y="183099"/>
-            <a:ext cx="6019800" cy="3901018"/>
+            <a:off x="685800" y="366198"/>
+            <a:ext cx="9029700" cy="7802036"/>
           </a:xfrm>
         </p:spPr>
         <p:txBody>
@@ -654,7 +664,7 @@
           <a:p>
             <a:fld id="{5064B7A2-D91B-45A0-9A08-FA3D47D35952}" type="datetimeFigureOut">
               <a:rPr lang="en-US" smtClean="0"/>
-              <a:t>4/7/2015</a:t>
+              <a:t>4/27/2015</a:t>
             </a:fld>
             <a:endParaRPr lang="en-US"/>
           </a:p>
@@ -824,7 +834,7 @@
           <a:p>
             <a:fld id="{5064B7A2-D91B-45A0-9A08-FA3D47D35952}" type="datetimeFigureOut">
               <a:rPr lang="en-US" smtClean="0"/>
-              <a:t>4/7/2015</a:t>
+              <a:t>4/27/2015</a:t>
             </a:fld>
             <a:endParaRPr lang="en-US"/>
           </a:p>
@@ -914,8 +924,8 @@
         </p:nvSpPr>
         <p:spPr>
           <a:xfrm>
-            <a:off x="722313" y="2937938"/>
-            <a:ext cx="7772400" cy="908050"/>
+            <a:off x="1083470" y="5875876"/>
+            <a:ext cx="11658600" cy="1816100"/>
           </a:xfrm>
         </p:spPr>
         <p:txBody>
@@ -946,8 +956,8 @@
         </p:nvSpPr>
         <p:spPr>
           <a:xfrm>
-            <a:off x="722313" y="1937814"/>
-            <a:ext cx="7772400" cy="1000123"/>
+            <a:off x="1083470" y="3875629"/>
+            <a:ext cx="11658600" cy="2000246"/>
           </a:xfrm>
         </p:spPr>
         <p:txBody>
@@ -1070,7 +1080,7 @@
           <a:p>
             <a:fld id="{5064B7A2-D91B-45A0-9A08-FA3D47D35952}" type="datetimeFigureOut">
               <a:rPr lang="en-US" smtClean="0"/>
-              <a:t>4/7/2015</a:t>
+              <a:t>4/27/2015</a:t>
             </a:fld>
             <a:endParaRPr lang="en-US"/>
           </a:p>
@@ -1183,8 +1193,8 @@
         </p:nvSpPr>
         <p:spPr>
           <a:xfrm>
-            <a:off x="457200" y="1066806"/>
-            <a:ext cx="4038600" cy="3017308"/>
+            <a:off x="685800" y="2133612"/>
+            <a:ext cx="6057900" cy="6034616"/>
           </a:xfrm>
         </p:spPr>
         <p:txBody>
@@ -1268,8 +1278,8 @@
         </p:nvSpPr>
         <p:spPr>
           <a:xfrm>
-            <a:off x="4648200" y="1066806"/>
-            <a:ext cx="4038600" cy="3017308"/>
+            <a:off x="6972300" y="2133612"/>
+            <a:ext cx="6057900" cy="6034616"/>
           </a:xfrm>
         </p:spPr>
         <p:txBody>
@@ -1358,7 +1368,7 @@
           <a:p>
             <a:fld id="{5064B7A2-D91B-45A0-9A08-FA3D47D35952}" type="datetimeFigureOut">
               <a:rPr lang="en-US" smtClean="0"/>
-              <a:t>4/7/2015</a:t>
+              <a:t>4/27/2015</a:t>
             </a:fld>
             <a:endParaRPr lang="en-US"/>
           </a:p>
@@ -1475,8 +1485,8 @@
         </p:nvSpPr>
         <p:spPr>
           <a:xfrm>
-            <a:off x="457210" y="1023411"/>
-            <a:ext cx="4040187" cy="426508"/>
+            <a:off x="685816" y="2046822"/>
+            <a:ext cx="6060281" cy="853016"/>
           </a:xfrm>
         </p:spPr>
         <p:txBody>
@@ -1540,8 +1550,8 @@
         </p:nvSpPr>
         <p:spPr>
           <a:xfrm>
-            <a:off x="457210" y="1449921"/>
-            <a:ext cx="4040187" cy="2634193"/>
+            <a:off x="685816" y="2899843"/>
+            <a:ext cx="6060281" cy="5268386"/>
           </a:xfrm>
         </p:spPr>
         <p:txBody>
@@ -1625,8 +1635,8 @@
         </p:nvSpPr>
         <p:spPr>
           <a:xfrm>
-            <a:off x="4645032" y="1023411"/>
-            <a:ext cx="4041777" cy="426508"/>
+            <a:off x="6967549" y="2046822"/>
+            <a:ext cx="6062666" cy="853016"/>
           </a:xfrm>
         </p:spPr>
         <p:txBody>
@@ -1690,8 +1700,8 @@
         </p:nvSpPr>
         <p:spPr>
           <a:xfrm>
-            <a:off x="4645032" y="1449921"/>
-            <a:ext cx="4041777" cy="2634193"/>
+            <a:off x="6967549" y="2899843"/>
+            <a:ext cx="6062666" cy="5268386"/>
           </a:xfrm>
         </p:spPr>
         <p:txBody>
@@ -1780,7 +1790,7 @@
           <a:p>
             <a:fld id="{5064B7A2-D91B-45A0-9A08-FA3D47D35952}" type="datetimeFigureOut">
               <a:rPr lang="en-US" smtClean="0"/>
-              <a:t>4/7/2015</a:t>
+              <a:t>4/27/2015</a:t>
             </a:fld>
             <a:endParaRPr lang="en-US"/>
           </a:p>
@@ -1898,7 +1908,7 @@
           <a:p>
             <a:fld id="{5064B7A2-D91B-45A0-9A08-FA3D47D35952}" type="datetimeFigureOut">
               <a:rPr lang="en-US" smtClean="0"/>
-              <a:t>4/7/2015</a:t>
+              <a:t>4/27/2015</a:t>
             </a:fld>
             <a:endParaRPr lang="en-US"/>
           </a:p>
@@ -1993,7 +2003,7 @@
           <a:p>
             <a:fld id="{5064B7A2-D91B-45A0-9A08-FA3D47D35952}" type="datetimeFigureOut">
               <a:rPr lang="en-US" smtClean="0"/>
-              <a:t>4/7/2015</a:t>
+              <a:t>4/27/2015</a:t>
             </a:fld>
             <a:endParaRPr lang="en-US"/>
           </a:p>
@@ -2083,8 +2093,8 @@
         </p:nvSpPr>
         <p:spPr>
           <a:xfrm>
-            <a:off x="457204" y="182033"/>
-            <a:ext cx="3008313" cy="774700"/>
+            <a:off x="685807" y="364066"/>
+            <a:ext cx="4512470" cy="1549400"/>
           </a:xfrm>
         </p:spPr>
         <p:txBody>
@@ -2115,8 +2125,8 @@
         </p:nvSpPr>
         <p:spPr>
           <a:xfrm>
-            <a:off x="3575050" y="182036"/>
-            <a:ext cx="5111753" cy="3902078"/>
+            <a:off x="5362576" y="364072"/>
+            <a:ext cx="7667630" cy="7804156"/>
           </a:xfrm>
         </p:spPr>
         <p:txBody>
@@ -2200,8 +2210,8 @@
         </p:nvSpPr>
         <p:spPr>
           <a:xfrm>
-            <a:off x="457204" y="956736"/>
-            <a:ext cx="3008313" cy="3127378"/>
+            <a:off x="685807" y="1913472"/>
+            <a:ext cx="4512470" cy="6254756"/>
           </a:xfrm>
         </p:spPr>
         <p:txBody>
@@ -2270,7 +2280,7 @@
           <a:p>
             <a:fld id="{5064B7A2-D91B-45A0-9A08-FA3D47D35952}" type="datetimeFigureOut">
               <a:rPr lang="en-US" smtClean="0"/>
-              <a:t>4/7/2015</a:t>
+              <a:t>4/27/2015</a:t>
             </a:fld>
             <a:endParaRPr lang="en-US"/>
           </a:p>
@@ -2360,8 +2370,8 @@
         </p:nvSpPr>
         <p:spPr>
           <a:xfrm>
-            <a:off x="1792287" y="3200404"/>
-            <a:ext cx="5486400" cy="377828"/>
+            <a:off x="2688431" y="6400808"/>
+            <a:ext cx="8229600" cy="755656"/>
           </a:xfrm>
         </p:spPr>
         <p:txBody>
@@ -2392,8 +2402,8 @@
         </p:nvSpPr>
         <p:spPr>
           <a:xfrm>
-            <a:off x="1792287" y="408518"/>
-            <a:ext cx="5486400" cy="2743200"/>
+            <a:off x="2688431" y="817036"/>
+            <a:ext cx="8229600" cy="5486400"/>
           </a:xfrm>
         </p:spPr>
         <p:txBody>
@@ -2453,8 +2463,8 @@
         </p:nvSpPr>
         <p:spPr>
           <a:xfrm>
-            <a:off x="1792287" y="3578231"/>
-            <a:ext cx="5486400" cy="536573"/>
+            <a:off x="2688431" y="7156463"/>
+            <a:ext cx="8229600" cy="1073146"/>
           </a:xfrm>
         </p:spPr>
         <p:txBody>
@@ -2523,7 +2533,7 @@
           <a:p>
             <a:fld id="{5064B7A2-D91B-45A0-9A08-FA3D47D35952}" type="datetimeFigureOut">
               <a:rPr lang="en-US" smtClean="0"/>
-              <a:t>4/7/2015</a:t>
+              <a:t>4/27/2015</a:t>
             </a:fld>
             <a:endParaRPr lang="en-US"/>
           </a:p>
@@ -2618,8 +2628,8 @@
         </p:nvSpPr>
         <p:spPr>
           <a:xfrm>
-            <a:off x="457200" y="183093"/>
-            <a:ext cx="8229600" cy="762000"/>
+            <a:off x="685800" y="366186"/>
+            <a:ext cx="12344400" cy="1524000"/>
           </a:xfrm>
           <a:prstGeom prst="rect">
             <a:avLst/>
@@ -2651,8 +2661,8 @@
         </p:nvSpPr>
         <p:spPr>
           <a:xfrm>
-            <a:off x="457200" y="1066806"/>
-            <a:ext cx="8229600" cy="3017308"/>
+            <a:off x="685800" y="2133612"/>
+            <a:ext cx="12344400" cy="6034616"/>
           </a:xfrm>
           <a:prstGeom prst="rect">
             <a:avLst/>
@@ -2713,8 +2723,8 @@
         </p:nvSpPr>
         <p:spPr>
           <a:xfrm>
-            <a:off x="457200" y="4237571"/>
-            <a:ext cx="2133600" cy="243418"/>
+            <a:off x="685800" y="8475142"/>
+            <a:ext cx="3200400" cy="486836"/>
           </a:xfrm>
           <a:prstGeom prst="rect">
             <a:avLst/>
@@ -2736,7 +2746,7 @@
           <a:p>
             <a:fld id="{5064B7A2-D91B-45A0-9A08-FA3D47D35952}" type="datetimeFigureOut">
               <a:rPr lang="en-US" smtClean="0"/>
-              <a:t>4/7/2015</a:t>
+              <a:t>4/27/2015</a:t>
             </a:fld>
             <a:endParaRPr lang="en-US"/>
           </a:p>
@@ -2754,8 +2764,8 @@
         </p:nvSpPr>
         <p:spPr>
           <a:xfrm>
-            <a:off x="3124200" y="4237571"/>
-            <a:ext cx="2895600" cy="243418"/>
+            <a:off x="4686300" y="8475142"/>
+            <a:ext cx="4343400" cy="486836"/>
           </a:xfrm>
           <a:prstGeom prst="rect">
             <a:avLst/>
@@ -2791,8 +2801,8 @@
         </p:nvSpPr>
         <p:spPr>
           <a:xfrm>
-            <a:off x="6553200" y="4237571"/>
-            <a:ext cx="2133600" cy="243418"/>
+            <a:off x="9829800" y="8475142"/>
+            <a:ext cx="3200400" cy="486836"/>
           </a:xfrm>
           <a:prstGeom prst="rect">
             <a:avLst/>
@@ -3113,21 +3123,21 @@
       </p:grpSpPr>
       <p:grpSp>
         <p:nvGrpSpPr>
-          <p:cNvPr id="49" name="Group 48"/>
+          <p:cNvPr id="50" name="Group 49"/>
           <p:cNvGrpSpPr/>
           <p:nvPr/>
         </p:nvGrpSpPr>
         <p:grpSpPr>
           <a:xfrm>
-            <a:off x="-3188609" y="169157"/>
-            <a:ext cx="15190160" cy="5017865"/>
-            <a:chOff x="-811117" y="364166"/>
-            <a:chExt cx="4427097" cy="1462432"/>
+            <a:off x="-6324600" y="453414"/>
+            <a:ext cx="27168786" cy="8690587"/>
+            <a:chOff x="-811117" y="410485"/>
+            <a:chExt cx="4427097" cy="1416113"/>
           </a:xfrm>
         </p:grpSpPr>
         <p:sp>
           <p:nvSpPr>
-            <p:cNvPr id="54" name="Parallelogram 53"/>
+            <p:cNvPr id="51" name="Parallelogram 50"/>
             <p:cNvSpPr/>
             <p:nvPr/>
           </p:nvSpPr>
@@ -3181,28 +3191,28 @@
         </p:sp>
         <p:grpSp>
           <p:nvGrpSpPr>
-            <p:cNvPr id="55" name="Group 54"/>
+            <p:cNvPr id="52" name="Group 51"/>
             <p:cNvGrpSpPr/>
             <p:nvPr/>
           </p:nvGrpSpPr>
           <p:grpSpPr>
             <a:xfrm>
               <a:off x="595471" y="794395"/>
-              <a:ext cx="466405" cy="611981"/>
+              <a:ext cx="468421" cy="611981"/>
               <a:chOff x="455886" y="1295400"/>
-              <a:chExt cx="542790" cy="611981"/>
+              <a:chExt cx="545136" cy="611981"/>
             </a:xfrm>
           </p:grpSpPr>
           <p:cxnSp>
             <p:nvCxnSpPr>
-              <p:cNvPr id="105" name="Straight Connector 104"/>
+              <p:cNvPr id="139" name="Straight Connector 138"/>
               <p:cNvCxnSpPr/>
               <p:nvPr/>
             </p:nvCxnSpPr>
             <p:spPr>
               <a:xfrm flipH="1">
-                <a:off x="838203" y="1438688"/>
-                <a:ext cx="160473" cy="9112"/>
+                <a:off x="838203" y="1442894"/>
+                <a:ext cx="162819" cy="4906"/>
               </a:xfrm>
               <a:prstGeom prst="line">
                 <a:avLst/>
@@ -3230,7 +3240,7 @@
           </p:cxnSp>
           <p:cxnSp>
             <p:nvCxnSpPr>
-              <p:cNvPr id="106" name="Straight Connector 105"/>
+              <p:cNvPr id="140" name="Straight Connector 139"/>
               <p:cNvCxnSpPr/>
               <p:nvPr/>
             </p:nvCxnSpPr>
@@ -3265,7 +3275,7 @@
           </p:cxnSp>
           <p:cxnSp>
             <p:nvCxnSpPr>
-              <p:cNvPr id="107" name="Straight Connector 106"/>
+              <p:cNvPr id="141" name="Straight Connector 140"/>
               <p:cNvCxnSpPr/>
               <p:nvPr/>
             </p:nvCxnSpPr>
@@ -3300,7 +3310,7 @@
           </p:cxnSp>
           <p:cxnSp>
             <p:nvCxnSpPr>
-              <p:cNvPr id="108" name="Straight Connector 107"/>
+              <p:cNvPr id="142" name="Straight Connector 141"/>
               <p:cNvCxnSpPr/>
               <p:nvPr/>
             </p:nvCxnSpPr>
@@ -3336,7 +3346,7 @@
         </p:grpSp>
         <p:grpSp>
           <p:nvGrpSpPr>
-            <p:cNvPr id="56" name="Group 55"/>
+            <p:cNvPr id="53" name="Group 52"/>
             <p:cNvGrpSpPr/>
             <p:nvPr/>
           </p:nvGrpSpPr>
@@ -3350,7 +3360,7 @@
           </p:grpSpPr>
           <p:cxnSp>
             <p:nvCxnSpPr>
-              <p:cNvPr id="101" name="Straight Connector 100"/>
+              <p:cNvPr id="135" name="Straight Connector 134"/>
               <p:cNvCxnSpPr/>
               <p:nvPr/>
             </p:nvCxnSpPr>
@@ -3385,14 +3395,14 @@
           </p:cxnSp>
           <p:cxnSp>
             <p:nvCxnSpPr>
-              <p:cNvPr id="102" name="Straight Connector 101"/>
+              <p:cNvPr id="136" name="Straight Connector 135"/>
               <p:cNvCxnSpPr/>
               <p:nvPr/>
             </p:nvCxnSpPr>
             <p:spPr>
               <a:xfrm flipH="1" flipV="1">
                 <a:off x="672334" y="1371601"/>
-                <a:ext cx="157754" cy="114299"/>
+                <a:ext cx="161532" cy="118505"/>
               </a:xfrm>
               <a:prstGeom prst="line">
                 <a:avLst/>
@@ -3420,7 +3430,7 @@
           </p:cxnSp>
           <p:cxnSp>
             <p:nvCxnSpPr>
-              <p:cNvPr id="103" name="Straight Connector 102"/>
+              <p:cNvPr id="137" name="Straight Connector 136"/>
               <p:cNvCxnSpPr/>
               <p:nvPr/>
             </p:nvCxnSpPr>
@@ -3455,7 +3465,7 @@
           </p:cxnSp>
           <p:cxnSp>
             <p:nvCxnSpPr>
-              <p:cNvPr id="104" name="Straight Connector 103"/>
+              <p:cNvPr id="138" name="Straight Connector 137"/>
               <p:cNvCxnSpPr/>
               <p:nvPr/>
             </p:nvCxnSpPr>
@@ -3491,7 +3501,7 @@
         </p:grpSp>
         <p:grpSp>
           <p:nvGrpSpPr>
-            <p:cNvPr id="57" name="Group 56"/>
+            <p:cNvPr id="62" name="Group 61"/>
             <p:cNvGrpSpPr/>
             <p:nvPr/>
           </p:nvGrpSpPr>
@@ -3505,7 +3515,7 @@
           </p:grpSpPr>
           <p:cxnSp>
             <p:nvCxnSpPr>
-              <p:cNvPr id="97" name="Straight Connector 96"/>
+              <p:cNvPr id="131" name="Straight Connector 130"/>
               <p:cNvCxnSpPr/>
               <p:nvPr/>
             </p:nvCxnSpPr>
@@ -3540,7 +3550,7 @@
           </p:cxnSp>
           <p:cxnSp>
             <p:nvCxnSpPr>
-              <p:cNvPr id="98" name="Straight Connector 97"/>
+              <p:cNvPr id="132" name="Straight Connector 131"/>
               <p:cNvCxnSpPr/>
               <p:nvPr/>
             </p:nvCxnSpPr>
@@ -3575,7 +3585,7 @@
           </p:cxnSp>
           <p:cxnSp>
             <p:nvCxnSpPr>
-              <p:cNvPr id="99" name="Straight Connector 98"/>
+              <p:cNvPr id="133" name="Straight Connector 132"/>
               <p:cNvCxnSpPr/>
               <p:nvPr/>
             </p:nvCxnSpPr>
@@ -3610,7 +3620,7 @@
           </p:cxnSp>
           <p:cxnSp>
             <p:nvCxnSpPr>
-              <p:cNvPr id="100" name="Straight Connector 99"/>
+              <p:cNvPr id="134" name="Straight Connector 133"/>
               <p:cNvCxnSpPr/>
               <p:nvPr/>
             </p:nvCxnSpPr>
@@ -3646,7 +3656,7 @@
         </p:grpSp>
         <p:sp>
           <p:nvSpPr>
-            <p:cNvPr id="58" name="Cube 57"/>
+            <p:cNvPr id="67" name="Cube 66"/>
             <p:cNvSpPr/>
             <p:nvPr/>
           </p:nvSpPr>
@@ -3694,21 +3704,21 @@
         </p:sp>
         <p:grpSp>
           <p:nvGrpSpPr>
-            <p:cNvPr id="59" name="Group 58"/>
+            <p:cNvPr id="70" name="Group 69"/>
             <p:cNvGrpSpPr/>
             <p:nvPr/>
           </p:nvGrpSpPr>
           <p:grpSpPr>
             <a:xfrm>
-              <a:off x="1036433" y="1146969"/>
-              <a:ext cx="274028" cy="369167"/>
-              <a:chOff x="533400" y="228600"/>
-              <a:chExt cx="274028" cy="369167"/>
+              <a:off x="1035242" y="1146969"/>
+              <a:ext cx="277997" cy="368362"/>
+              <a:chOff x="532209" y="228600"/>
+              <a:chExt cx="277997" cy="368362"/>
             </a:xfrm>
           </p:grpSpPr>
           <p:cxnSp>
             <p:nvCxnSpPr>
-              <p:cNvPr id="94" name="Straight Arrow Connector 93"/>
+              <p:cNvPr id="128" name="Straight Arrow Connector 127"/>
               <p:cNvCxnSpPr/>
               <p:nvPr/>
             </p:nvCxnSpPr>
@@ -3745,13 +3755,13 @@
           </p:cxnSp>
           <p:cxnSp>
             <p:nvCxnSpPr>
-              <p:cNvPr id="95" name="Straight Arrow Connector 94"/>
+              <p:cNvPr id="129" name="Straight Arrow Connector 128"/>
               <p:cNvCxnSpPr/>
               <p:nvPr/>
             </p:nvCxnSpPr>
             <p:spPr>
               <a:xfrm flipH="1">
-                <a:off x="533400" y="454819"/>
+                <a:off x="532209" y="456359"/>
                 <a:ext cx="230982" cy="0"/>
               </a:xfrm>
               <a:prstGeom prst="straightConnector1">
@@ -3779,13 +3789,13 @@
           </p:cxnSp>
           <p:cxnSp>
             <p:nvCxnSpPr>
-              <p:cNvPr id="96" name="Straight Arrow Connector 95"/>
+              <p:cNvPr id="130" name="Straight Arrow Connector 129"/>
               <p:cNvCxnSpPr/>
               <p:nvPr/>
             </p:nvCxnSpPr>
             <p:spPr>
               <a:xfrm rot="19338467" flipH="1">
-                <a:off x="617896" y="505476"/>
+                <a:off x="620674" y="504671"/>
                 <a:ext cx="189532" cy="92291"/>
               </a:xfrm>
               <a:prstGeom prst="straightConnector1">
@@ -3817,7 +3827,7 @@
         </p:grpSp>
         <p:grpSp>
           <p:nvGrpSpPr>
-            <p:cNvPr id="60" name="Group 59"/>
+            <p:cNvPr id="71" name="Group 70"/>
             <p:cNvGrpSpPr/>
             <p:nvPr/>
           </p:nvGrpSpPr>
@@ -3831,7 +3841,7 @@
           </p:grpSpPr>
           <p:cxnSp>
             <p:nvCxnSpPr>
-              <p:cNvPr id="90" name="Straight Connector 89"/>
+              <p:cNvPr id="124" name="Straight Connector 123"/>
               <p:cNvCxnSpPr/>
               <p:nvPr/>
             </p:nvCxnSpPr>
@@ -3868,7 +3878,7 @@
           </p:cxnSp>
           <p:cxnSp>
             <p:nvCxnSpPr>
-              <p:cNvPr id="91" name="Straight Connector 90"/>
+              <p:cNvPr id="125" name="Straight Connector 124"/>
               <p:cNvCxnSpPr/>
               <p:nvPr/>
             </p:nvCxnSpPr>
@@ -3905,7 +3915,7 @@
           </p:cxnSp>
           <p:cxnSp>
             <p:nvCxnSpPr>
-              <p:cNvPr id="92" name="Straight Connector 91"/>
+              <p:cNvPr id="126" name="Straight Connector 125"/>
               <p:cNvCxnSpPr/>
               <p:nvPr/>
             </p:nvCxnSpPr>
@@ -3942,7 +3952,7 @@
           </p:cxnSp>
           <p:cxnSp>
             <p:nvCxnSpPr>
-              <p:cNvPr id="93" name="Straight Connector 92"/>
+              <p:cNvPr id="127" name="Straight Connector 126"/>
               <p:cNvCxnSpPr/>
               <p:nvPr/>
             </p:nvCxnSpPr>
@@ -3982,14 +3992,14 @@
           <mc:Choice xmlns:a14="http://schemas.microsoft.com/office/drawing/2010/main" Requires="a14">
             <p:sp>
               <p:nvSpPr>
-                <p:cNvPr id="61" name="TextBox 60"/>
+                <p:cNvPr id="74" name="TextBox 73"/>
                 <p:cNvSpPr txBox="1"/>
                 <p:nvPr/>
               </p:nvSpPr>
               <p:spPr>
                 <a:xfrm>
-                  <a:off x="1256597" y="1296943"/>
-                  <a:ext cx="184271" cy="152490"/>
+                  <a:off x="1260180" y="1332100"/>
+                  <a:ext cx="109351" cy="85258"/>
                 </a:xfrm>
                 <a:prstGeom prst="rect">
                   <a:avLst/>
@@ -4013,7 +4023,7 @@
                           <m:sSubPr>
                             <m:ctrlPr>
                               <a:rPr lang="en-US" sz="2800" b="0" i="1" smtClean="0">
-                                <a:latin typeface="Cambria Math"/>
+                                <a:latin typeface="Cambria Math" panose="02040503050406030204" pitchFamily="18" charset="0"/>
                               </a:rPr>
                             </m:ctrlPr>
                           </m:sSubPr>
@@ -4045,7 +4055,7 @@
           <mc:Fallback>
             <p:sp>
               <p:nvSpPr>
-                <p:cNvPr id="61" name="TextBox 60"/>
+                <p:cNvPr id="74" name="TextBox 73"/>
                 <p:cNvSpPr txBox="1">
                   <a:spLocks noRot="1" noChangeAspect="1" noMove="1" noResize="1" noEditPoints="1" noAdjustHandles="1" noChangeArrowheads="1" noChangeShapeType="1" noTextEdit="1"/>
                 </p:cNvSpPr>
@@ -4053,13 +4063,13 @@
               </p:nvSpPr>
               <p:spPr>
                 <a:xfrm>
-                  <a:off x="1256597" y="1296943"/>
-                  <a:ext cx="184271" cy="152490"/>
+                  <a:off x="1260180" y="1332100"/>
+                  <a:ext cx="109351" cy="85258"/>
                 </a:xfrm>
                 <a:prstGeom prst="rect">
                   <a:avLst/>
                 </a:prstGeom>
-                <a:blipFill rotWithShape="1">
+                <a:blipFill rotWithShape="0">
                   <a:blip r:embed="rId2"/>
                   <a:stretch>
                     <a:fillRect/>
@@ -4085,14 +4095,14 @@
           <mc:Choice xmlns:a14="http://schemas.microsoft.com/office/drawing/2010/main" Requires="a14">
             <p:sp>
               <p:nvSpPr>
-                <p:cNvPr id="63" name="TextBox 62"/>
+                <p:cNvPr id="75" name="TextBox 74"/>
                 <p:cNvSpPr txBox="1"/>
                 <p:nvPr/>
               </p:nvSpPr>
               <p:spPr>
                 <a:xfrm>
-                  <a:off x="1003433" y="882453"/>
-                  <a:ext cx="322213" cy="158003"/>
+                  <a:off x="1114583" y="950802"/>
+                  <a:ext cx="74675" cy="67381"/>
                 </a:xfrm>
                 <a:prstGeom prst="rect">
                   <a:avLst/>
@@ -4115,14 +4125,14 @@
                         <m:sSub>
                           <m:sSubPr>
                             <m:ctrlPr>
-                              <a:rPr lang="en-US" sz="2800" b="0" i="1" smtClean="0">
-                                <a:latin typeface="Cambria Math"/>
+                              <a:rPr lang="en-US" sz="2000" b="0" i="1" smtClean="0">
+                                <a:latin typeface="Cambria Math" panose="02040503050406030204" pitchFamily="18" charset="0"/>
                               </a:rPr>
                             </m:ctrlPr>
                           </m:sSubPr>
                           <m:e>
                             <m:r>
-                              <a:rPr lang="en-US" sz="2800" b="0" i="1" smtClean="0">
+                              <a:rPr lang="en-US" sz="2000" b="0" i="1" smtClean="0">
                                 <a:latin typeface="Cambria Math"/>
                               </a:rPr>
                               <m:t>𝑂</m:t>
@@ -4130,13 +4140,13 @@
                           </m:e>
                           <m:sub>
                             <m:r>
-                              <a:rPr lang="en-US" sz="2800" b="0" i="1" smtClean="0">
+                              <a:rPr lang="en-US" sz="2000" b="0" i="1" smtClean="0">
                                 <a:latin typeface="Cambria Math"/>
                               </a:rPr>
                               <m:t>1,</m:t>
                             </m:r>
                             <m:r>
-                              <a:rPr lang="en-US" sz="2800" b="0" i="1" smtClean="0">
+                              <a:rPr lang="en-US" sz="2000" b="0" i="1" smtClean="0">
                                 <a:latin typeface="Cambria Math" panose="02040503050406030204" pitchFamily="18" charset="0"/>
                               </a:rPr>
                               <m:t>0</m:t>
@@ -4146,7 +4156,7 @@
                       </m:oMath>
                     </m:oMathPara>
                   </a14:m>
-                  <a:endParaRPr lang="en-US" sz="2800" dirty="0"/>
+                  <a:endParaRPr lang="en-US" sz="2000" dirty="0"/>
                 </a:p>
               </p:txBody>
             </p:sp>
@@ -4154,7 +4164,7 @@
           <mc:Fallback>
             <p:sp>
               <p:nvSpPr>
-                <p:cNvPr id="63" name="TextBox 62"/>
+                <p:cNvPr id="75" name="TextBox 74"/>
                 <p:cNvSpPr txBox="1">
                   <a:spLocks noRot="1" noChangeAspect="1" noMove="1" noResize="1" noEditPoints="1" noAdjustHandles="1" noChangeArrowheads="1" noChangeShapeType="1" noTextEdit="1"/>
                 </p:cNvSpPr>
@@ -4162,16 +4172,16 @@
               </p:nvSpPr>
               <p:spPr>
                 <a:xfrm>
-                  <a:off x="1003433" y="882453"/>
-                  <a:ext cx="322213" cy="158003"/>
+                  <a:off x="1114583" y="950802"/>
+                  <a:ext cx="74675" cy="67381"/>
                 </a:xfrm>
                 <a:prstGeom prst="rect">
                   <a:avLst/>
                 </a:prstGeom>
-                <a:blipFill rotWithShape="1">
+                <a:blipFill rotWithShape="0">
                   <a:blip r:embed="rId3"/>
                   <a:stretch>
-                    <a:fillRect/>
+                    <a:fillRect r="-24000"/>
                   </a:stretch>
                 </a:blipFill>
               </p:spPr>
@@ -4190,18 +4200,18 @@
             </p:sp>
           </mc:Fallback>
         </mc:AlternateContent>
-        <mc:AlternateContent xmlns:mc="http://schemas.openxmlformats.org/markup-compatibility/2006" xmlns:a14="http://schemas.microsoft.com/office/drawing/2010/main">
-          <mc:Choice Requires="a14">
+        <mc:AlternateContent xmlns:mc="http://schemas.openxmlformats.org/markup-compatibility/2006">
+          <mc:Choice xmlns:a14="http://schemas.microsoft.com/office/drawing/2010/main" Requires="a14">
             <p:sp>
               <p:nvSpPr>
-                <p:cNvPr id="64" name="TextBox 63"/>
+                <p:cNvPr id="76" name="TextBox 75"/>
                 <p:cNvSpPr txBox="1"/>
                 <p:nvPr/>
               </p:nvSpPr>
               <p:spPr>
                 <a:xfrm>
-                  <a:off x="475784" y="1345471"/>
-                  <a:ext cx="246672" cy="120516"/>
+                  <a:off x="472135" y="1380540"/>
+                  <a:ext cx="246672" cy="88340"/>
                 </a:xfrm>
                 <a:prstGeom prst="rect">
                   <a:avLst/>
@@ -4224,14 +4234,14 @@
                         <m:sSub>
                           <m:sSubPr>
                             <m:ctrlPr>
-                              <a:rPr lang="en-US" sz="2000" b="0" i="1" smtClean="0">
-                                <a:latin typeface="Cambria Math"/>
+                              <a:rPr lang="en-US" sz="2800" b="0" i="1" smtClean="0">
+                                <a:latin typeface="Cambria Math" panose="02040503050406030204" pitchFamily="18" charset="0"/>
                               </a:rPr>
                             </m:ctrlPr>
                           </m:sSubPr>
                           <m:e>
                             <m:r>
-                              <a:rPr lang="en-US" sz="2000" b="0" i="1" smtClean="0">
+                              <a:rPr lang="en-US" sz="2800" b="0" i="1" smtClean="0">
                                 <a:latin typeface="Cambria Math" panose="02040503050406030204" pitchFamily="18" charset="0"/>
                               </a:rPr>
                               <m:t>𝑝</m:t>
@@ -4239,13 +4249,13 @@
                           </m:e>
                           <m:sub>
                             <m:r>
-                              <a:rPr lang="en-US" sz="2000" b="0" i="1" smtClean="0">
+                              <a:rPr lang="en-US" sz="2800" b="0" i="1" smtClean="0">
                                 <a:latin typeface="Cambria Math"/>
                               </a:rPr>
                               <m:t>1,</m:t>
                             </m:r>
                             <m:r>
-                              <a:rPr lang="en-US" sz="2000" b="0" i="1" smtClean="0">
+                              <a:rPr lang="en-US" sz="2800" b="0" i="1" smtClean="0">
                                 <a:latin typeface="Cambria Math" panose="02040503050406030204" pitchFamily="18" charset="0"/>
                               </a:rPr>
                               <m:t>𝑒</m:t>
@@ -4255,15 +4265,15 @@
                       </m:oMath>
                     </m:oMathPara>
                   </a14:m>
-                  <a:endParaRPr lang="en-US" sz="2000" dirty="0"/>
+                  <a:endParaRPr lang="en-US" sz="2800" dirty="0"/>
                 </a:p>
               </p:txBody>
             </p:sp>
           </mc:Choice>
-          <mc:Fallback xmlns="">
+          <mc:Fallback>
             <p:sp>
               <p:nvSpPr>
-                <p:cNvPr id="2" name="TextBox 1"/>
+                <p:cNvPr id="76" name="TextBox 75"/>
                 <p:cNvSpPr txBox="1">
                   <a:spLocks noRot="1" noChangeAspect="1" noMove="1" noResize="1" noEditPoints="1" noAdjustHandles="1" noChangeArrowheads="1" noChangeShapeType="1" noTextEdit="1"/>
                 </p:cNvSpPr>
@@ -4271,8 +4281,8 @@
               </p:nvSpPr>
               <p:spPr>
                 <a:xfrm>
-                  <a:off x="475784" y="1345471"/>
-                  <a:ext cx="246672" cy="192040"/>
+                  <a:off x="472135" y="1380540"/>
+                  <a:ext cx="246672" cy="88340"/>
                 </a:xfrm>
                 <a:prstGeom prst="rect">
                   <a:avLst/>
@@ -4299,18 +4309,18 @@
             </p:sp>
           </mc:Fallback>
         </mc:AlternateContent>
-        <mc:AlternateContent xmlns:mc="http://schemas.openxmlformats.org/markup-compatibility/2006" xmlns:a14="http://schemas.microsoft.com/office/drawing/2010/main">
-          <mc:Choice Requires="a14">
+        <mc:AlternateContent xmlns:mc="http://schemas.openxmlformats.org/markup-compatibility/2006">
+          <mc:Choice xmlns:a14="http://schemas.microsoft.com/office/drawing/2010/main" Requires="a14">
             <p:sp>
               <p:nvSpPr>
-                <p:cNvPr id="65" name="TextBox 64"/>
+                <p:cNvPr id="77" name="TextBox 76"/>
                 <p:cNvSpPr txBox="1"/>
                 <p:nvPr/>
               </p:nvSpPr>
               <p:spPr>
                 <a:xfrm>
-                  <a:off x="1916165" y="1552699"/>
-                  <a:ext cx="246672" cy="120516"/>
+                  <a:off x="1916539" y="1596775"/>
+                  <a:ext cx="246672" cy="88340"/>
                 </a:xfrm>
                 <a:prstGeom prst="rect">
                   <a:avLst/>
@@ -4333,14 +4343,14 @@
                         <m:sSub>
                           <m:sSubPr>
                             <m:ctrlPr>
-                              <a:rPr lang="en-US" sz="2000" b="0" i="1" smtClean="0">
-                                <a:latin typeface="Cambria Math"/>
+                              <a:rPr lang="en-US" sz="2800" b="0" i="1" smtClean="0">
+                                <a:latin typeface="Cambria Math" panose="02040503050406030204" pitchFamily="18" charset="0"/>
                               </a:rPr>
                             </m:ctrlPr>
                           </m:sSubPr>
                           <m:e>
                             <m:r>
-                              <a:rPr lang="en-US" sz="2000" b="0" i="1" smtClean="0">
+                              <a:rPr lang="en-US" sz="2800" b="0" i="1" smtClean="0">
                                 <a:latin typeface="Cambria Math" panose="02040503050406030204" pitchFamily="18" charset="0"/>
                               </a:rPr>
                               <m:t>𝑝</m:t>
@@ -4348,13 +4358,13 @@
                           </m:e>
                           <m:sub>
                             <m:r>
-                              <a:rPr lang="en-US" sz="2000" b="0" i="1" smtClean="0">
+                              <a:rPr lang="en-US" sz="2800" b="0" i="1" smtClean="0">
                                 <a:latin typeface="Cambria Math"/>
                               </a:rPr>
                               <m:t>2,</m:t>
                             </m:r>
                             <m:r>
-                              <a:rPr lang="en-US" sz="2000" b="0" i="1" smtClean="0">
+                              <a:rPr lang="en-US" sz="2800" b="0" i="1" smtClean="0">
                                 <a:latin typeface="Cambria Math" panose="02040503050406030204" pitchFamily="18" charset="0"/>
                               </a:rPr>
                               <m:t>𝑒</m:t>
@@ -4364,15 +4374,15 @@
                       </m:oMath>
                     </m:oMathPara>
                   </a14:m>
-                  <a:endParaRPr lang="en-US" sz="2000" dirty="0"/>
+                  <a:endParaRPr lang="en-US" sz="2800" dirty="0"/>
                 </a:p>
               </p:txBody>
             </p:sp>
           </mc:Choice>
-          <mc:Fallback xmlns="">
+          <mc:Fallback>
             <p:sp>
               <p:nvSpPr>
-                <p:cNvPr id="50" name="TextBox 49"/>
+                <p:cNvPr id="77" name="TextBox 76"/>
                 <p:cNvSpPr txBox="1">
                   <a:spLocks noRot="1" noChangeAspect="1" noMove="1" noResize="1" noEditPoints="1" noAdjustHandles="1" noChangeArrowheads="1" noChangeShapeType="1" noTextEdit="1"/>
                 </p:cNvSpPr>
@@ -4380,8 +4390,8 @@
               </p:nvSpPr>
               <p:spPr>
                 <a:xfrm>
-                  <a:off x="1916165" y="1552699"/>
-                  <a:ext cx="246672" cy="192040"/>
+                  <a:off x="1916539" y="1596775"/>
+                  <a:ext cx="246672" cy="88340"/>
                 </a:xfrm>
                 <a:prstGeom prst="rect">
                   <a:avLst/>
@@ -4408,18 +4418,18 @@
             </p:sp>
           </mc:Fallback>
         </mc:AlternateContent>
-        <mc:AlternateContent xmlns:mc="http://schemas.openxmlformats.org/markup-compatibility/2006" xmlns:a14="http://schemas.microsoft.com/office/drawing/2010/main">
-          <mc:Choice Requires="a14">
+        <mc:AlternateContent xmlns:mc="http://schemas.openxmlformats.org/markup-compatibility/2006">
+          <mc:Choice xmlns:a14="http://schemas.microsoft.com/office/drawing/2010/main" Requires="a14">
             <p:sp>
               <p:nvSpPr>
-                <p:cNvPr id="66" name="TextBox 65"/>
+                <p:cNvPr id="78" name="TextBox 77"/>
                 <p:cNvSpPr txBox="1"/>
                 <p:nvPr/>
               </p:nvSpPr>
               <p:spPr>
                 <a:xfrm>
-                  <a:off x="2029427" y="1227907"/>
-                  <a:ext cx="246672" cy="120516"/>
+                  <a:off x="1979870" y="1294467"/>
+                  <a:ext cx="246672" cy="88340"/>
                 </a:xfrm>
                 <a:prstGeom prst="rect">
                   <a:avLst/>
@@ -4442,14 +4452,14 @@
                         <m:sSub>
                           <m:sSubPr>
                             <m:ctrlPr>
-                              <a:rPr lang="en-US" sz="2000" b="0" i="1" smtClean="0">
-                                <a:latin typeface="Cambria Math"/>
+                              <a:rPr lang="en-US" sz="2800" b="0" i="1" smtClean="0">
+                                <a:latin typeface="Cambria Math" panose="02040503050406030204" pitchFamily="18" charset="0"/>
                               </a:rPr>
                             </m:ctrlPr>
                           </m:sSubPr>
                           <m:e>
                             <m:r>
-                              <a:rPr lang="en-US" sz="2000" b="0" i="1" smtClean="0">
+                              <a:rPr lang="en-US" sz="2800" b="0" i="1" smtClean="0">
                                 <a:latin typeface="Cambria Math" panose="02040503050406030204" pitchFamily="18" charset="0"/>
                               </a:rPr>
                               <m:t>𝑝</m:t>
@@ -4457,13 +4467,13 @@
                           </m:e>
                           <m:sub>
                             <m:r>
-                              <a:rPr lang="en-US" sz="2000" b="0" i="1" smtClean="0">
+                              <a:rPr lang="en-US" sz="2800" b="0" i="1" smtClean="0">
                                 <a:latin typeface="Cambria Math"/>
                               </a:rPr>
                               <m:t>3,</m:t>
                             </m:r>
                             <m:r>
-                              <a:rPr lang="en-US" sz="2000" b="0" i="1" smtClean="0">
+                              <a:rPr lang="en-US" sz="2800" b="0" i="1" smtClean="0">
                                 <a:latin typeface="Cambria Math" panose="02040503050406030204" pitchFamily="18" charset="0"/>
                               </a:rPr>
                               <m:t>𝑒</m:t>
@@ -4473,15 +4483,15 @@
                       </m:oMath>
                     </m:oMathPara>
                   </a14:m>
-                  <a:endParaRPr lang="en-US" sz="2000" dirty="0"/>
+                  <a:endParaRPr lang="en-US" sz="2800" dirty="0"/>
                 </a:p>
               </p:txBody>
             </p:sp>
           </mc:Choice>
-          <mc:Fallback xmlns="">
+          <mc:Fallback>
             <p:sp>
               <p:nvSpPr>
-                <p:cNvPr id="51" name="TextBox 50"/>
+                <p:cNvPr id="78" name="TextBox 77"/>
                 <p:cNvSpPr txBox="1">
                   <a:spLocks noRot="1" noChangeAspect="1" noMove="1" noResize="1" noEditPoints="1" noAdjustHandles="1" noChangeArrowheads="1" noChangeShapeType="1" noTextEdit="1"/>
                 </p:cNvSpPr>
@@ -4489,8 +4499,8 @@
               </p:nvSpPr>
               <p:spPr>
                 <a:xfrm>
-                  <a:off x="2029427" y="1227907"/>
-                  <a:ext cx="246672" cy="192040"/>
+                  <a:off x="1979870" y="1294467"/>
+                  <a:ext cx="246672" cy="88340"/>
                 </a:xfrm>
                 <a:prstGeom prst="rect">
                   <a:avLst/>
@@ -4517,18 +4527,18 @@
             </p:sp>
           </mc:Fallback>
         </mc:AlternateContent>
-        <mc:AlternateContent xmlns:mc="http://schemas.openxmlformats.org/markup-compatibility/2006" xmlns:a14="http://schemas.microsoft.com/office/drawing/2010/main">
-          <mc:Choice Requires="a14">
+        <mc:AlternateContent xmlns:mc="http://schemas.openxmlformats.org/markup-compatibility/2006">
+          <mc:Choice xmlns:a14="http://schemas.microsoft.com/office/drawing/2010/main" Requires="a14">
             <p:sp>
               <p:nvSpPr>
-                <p:cNvPr id="68" name="TextBox 67"/>
+                <p:cNvPr id="109" name="TextBox 108"/>
                 <p:cNvSpPr txBox="1"/>
                 <p:nvPr/>
               </p:nvSpPr>
               <p:spPr>
                 <a:xfrm>
-                  <a:off x="779657" y="1050343"/>
-                  <a:ext cx="246672" cy="120516"/>
+                  <a:off x="791617" y="1089242"/>
+                  <a:ext cx="246672" cy="88340"/>
                 </a:xfrm>
                 <a:prstGeom prst="rect">
                   <a:avLst/>
@@ -4551,14 +4561,14 @@
                         <m:sSub>
                           <m:sSubPr>
                             <m:ctrlPr>
-                              <a:rPr lang="en-US" sz="2000" b="0" i="1" smtClean="0">
-                                <a:latin typeface="Cambria Math"/>
+                              <a:rPr lang="en-US" sz="2800" b="0" i="1" smtClean="0">
+                                <a:latin typeface="Cambria Math" panose="02040503050406030204" pitchFamily="18" charset="0"/>
                               </a:rPr>
                             </m:ctrlPr>
                           </m:sSubPr>
                           <m:e>
                             <m:r>
-                              <a:rPr lang="en-US" sz="2000" b="0" i="1" smtClean="0">
+                              <a:rPr lang="en-US" sz="2800" b="0" i="1" smtClean="0">
                                 <a:latin typeface="Cambria Math" panose="02040503050406030204" pitchFamily="18" charset="0"/>
                               </a:rPr>
                               <m:t>𝑝</m:t>
@@ -4566,13 +4576,13 @@
                           </m:e>
                           <m:sub>
                             <m:r>
-                              <a:rPr lang="en-US" sz="2000" b="0" i="1" smtClean="0">
+                              <a:rPr lang="en-US" sz="2800" b="0" i="1" smtClean="0">
                                 <a:latin typeface="Cambria Math"/>
                               </a:rPr>
                               <m:t>4,</m:t>
                             </m:r>
                             <m:r>
-                              <a:rPr lang="en-US" sz="2000" b="0" i="1" smtClean="0">
+                              <a:rPr lang="en-US" sz="2800" b="0" i="1" smtClean="0">
                                 <a:latin typeface="Cambria Math" panose="02040503050406030204" pitchFamily="18" charset="0"/>
                               </a:rPr>
                               <m:t>𝑒</m:t>
@@ -4582,15 +4592,15 @@
                       </m:oMath>
                     </m:oMathPara>
                   </a14:m>
-                  <a:endParaRPr lang="en-US" sz="2000" dirty="0"/>
+                  <a:endParaRPr lang="en-US" sz="2800" dirty="0"/>
                 </a:p>
               </p:txBody>
             </p:sp>
           </mc:Choice>
-          <mc:Fallback xmlns="">
+          <mc:Fallback>
             <p:sp>
               <p:nvSpPr>
-                <p:cNvPr id="52" name="TextBox 51"/>
+                <p:cNvPr id="109" name="TextBox 108"/>
                 <p:cNvSpPr txBox="1">
                   <a:spLocks noRot="1" noChangeAspect="1" noMove="1" noResize="1" noEditPoints="1" noAdjustHandles="1" noChangeArrowheads="1" noChangeShapeType="1" noTextEdit="1"/>
                 </p:cNvSpPr>
@@ -4598,8 +4608,8 @@
               </p:nvSpPr>
               <p:spPr>
                 <a:xfrm>
-                  <a:off x="779657" y="1050343"/>
-                  <a:ext cx="246672" cy="192040"/>
+                  <a:off x="791617" y="1089242"/>
+                  <a:ext cx="246672" cy="88340"/>
                 </a:xfrm>
                 <a:prstGeom prst="rect">
                   <a:avLst/>
@@ -4626,18 +4636,18 @@
             </p:sp>
           </mc:Fallback>
         </mc:AlternateContent>
-        <mc:AlternateContent xmlns:mc="http://schemas.openxmlformats.org/markup-compatibility/2006" xmlns:a14="http://schemas.microsoft.com/office/drawing/2010/main">
-          <mc:Choice Requires="a14">
+        <mc:AlternateContent xmlns:mc="http://schemas.openxmlformats.org/markup-compatibility/2006">
+          <mc:Choice xmlns:a14="http://schemas.microsoft.com/office/drawing/2010/main" Requires="a14">
             <p:sp>
               <p:nvSpPr>
-                <p:cNvPr id="69" name="TextBox 68"/>
+                <p:cNvPr id="110" name="TextBox 109"/>
                 <p:cNvSpPr txBox="1"/>
                 <p:nvPr/>
               </p:nvSpPr>
               <p:spPr>
                 <a:xfrm>
-                  <a:off x="1473827" y="1133774"/>
-                  <a:ext cx="322213" cy="120516"/>
+                  <a:off x="1431125" y="1040296"/>
+                  <a:ext cx="107433" cy="67381"/>
                 </a:xfrm>
                 <a:prstGeom prst="rect">
                   <a:avLst/>
@@ -4661,7 +4671,7 @@
                           <m:sSubPr>
                             <m:ctrlPr>
                               <a:rPr lang="en-US" sz="2000" b="0" i="1" smtClean="0">
-                                <a:latin typeface="Cambria Math"/>
+                                <a:latin typeface="Cambria Math" panose="02040503050406030204" pitchFamily="18" charset="0"/>
                               </a:rPr>
                             </m:ctrlPr>
                           </m:sSubPr>
@@ -4696,10 +4706,10 @@
               </p:txBody>
             </p:sp>
           </mc:Choice>
-          <mc:Fallback xmlns="">
+          <mc:Fallback>
             <p:sp>
               <p:nvSpPr>
-                <p:cNvPr id="62" name="TextBox 61"/>
+                <p:cNvPr id="110" name="TextBox 109"/>
                 <p:cNvSpPr txBox="1">
                   <a:spLocks noRot="1" noChangeAspect="1" noMove="1" noResize="1" noEditPoints="1" noAdjustHandles="1" noChangeArrowheads="1" noChangeShapeType="1" noTextEdit="1"/>
                 </p:cNvSpPr>
@@ -4707,8 +4717,8 @@
               </p:nvSpPr>
               <p:spPr>
                 <a:xfrm>
-                  <a:off x="1473827" y="1133774"/>
-                  <a:ext cx="322213" cy="192938"/>
+                  <a:off x="1431125" y="1040296"/>
+                  <a:ext cx="107433" cy="67381"/>
                 </a:xfrm>
                 <a:prstGeom prst="rect">
                   <a:avLst/>
@@ -4737,14 +4747,14 @@
         </mc:AlternateContent>
         <p:cxnSp>
           <p:nvCxnSpPr>
-            <p:cNvPr id="72" name="Straight Arrow Connector 71"/>
+            <p:cNvPr id="111" name="Straight Arrow Connector 110"/>
             <p:cNvCxnSpPr/>
             <p:nvPr/>
           </p:nvCxnSpPr>
           <p:spPr>
             <a:xfrm flipH="1" flipV="1">
               <a:off x="902421" y="884118"/>
-              <a:ext cx="159455" cy="53564"/>
+              <a:ext cx="160764" cy="57771"/>
             </a:xfrm>
             <a:prstGeom prst="straightConnector1">
               <a:avLst/>
@@ -4772,7 +4782,7 @@
         </p:cxnSp>
         <p:cxnSp>
           <p:nvCxnSpPr>
-            <p:cNvPr id="73" name="Straight Arrow Connector 72"/>
+            <p:cNvPr id="112" name="Straight Arrow Connector 111"/>
             <p:cNvCxnSpPr/>
             <p:nvPr/>
           </p:nvCxnSpPr>
@@ -4810,14 +4820,14 @@
         </p:cxnSp>
         <p:cxnSp>
           <p:nvCxnSpPr>
-            <p:cNvPr id="79" name="Straight Arrow Connector 78"/>
+            <p:cNvPr id="113" name="Straight Arrow Connector 112"/>
             <p:cNvCxnSpPr/>
             <p:nvPr/>
           </p:nvCxnSpPr>
           <p:spPr>
             <a:xfrm>
-              <a:off x="1566714" y="1106049"/>
-              <a:ext cx="171249" cy="57526"/>
+              <a:off x="1568937" y="1110554"/>
+              <a:ext cx="169026" cy="53021"/>
             </a:xfrm>
             <a:prstGeom prst="straightConnector1">
               <a:avLst/>
@@ -4848,7 +4858,7 @@
         </p:cxnSp>
         <p:sp>
           <p:nvSpPr>
-            <p:cNvPr id="80" name="Cube 79"/>
+            <p:cNvPr id="114" name="Cube 113"/>
             <p:cNvSpPr/>
             <p:nvPr/>
           </p:nvSpPr>
@@ -4896,7 +4906,7 @@
         </p:sp>
         <p:cxnSp>
           <p:nvCxnSpPr>
-            <p:cNvPr id="81" name="Straight Arrow Connector 80"/>
+            <p:cNvPr id="115" name="Straight Arrow Connector 114"/>
             <p:cNvCxnSpPr/>
             <p:nvPr/>
           </p:nvCxnSpPr>
@@ -4934,14 +4944,14 @@
         </p:cxnSp>
         <p:cxnSp>
           <p:nvCxnSpPr>
-            <p:cNvPr id="82" name="Straight Arrow Connector 81"/>
+            <p:cNvPr id="116" name="Straight Arrow Connector 115"/>
             <p:cNvCxnSpPr/>
             <p:nvPr/>
           </p:nvCxnSpPr>
           <p:spPr>
             <a:xfrm flipH="1">
               <a:off x="1463218" y="1110554"/>
-              <a:ext cx="105719" cy="106043"/>
+              <a:ext cx="106881" cy="106043"/>
             </a:xfrm>
             <a:prstGeom prst="straightConnector1">
               <a:avLst/>
@@ -4972,7 +4982,7 @@
         </p:cxnSp>
         <p:cxnSp>
           <p:nvCxnSpPr>
-            <p:cNvPr id="83" name="Straight Arrow Connector 82"/>
+            <p:cNvPr id="117" name="Straight Arrow Connector 116"/>
             <p:cNvCxnSpPr/>
             <p:nvPr/>
           </p:nvCxnSpPr>
@@ -5010,7 +5020,7 @@
         </p:cxnSp>
         <p:grpSp>
           <p:nvGrpSpPr>
-            <p:cNvPr id="84" name="Group 83"/>
+            <p:cNvPr id="118" name="Group 117"/>
             <p:cNvGrpSpPr/>
             <p:nvPr/>
           </p:nvGrpSpPr>
@@ -5024,7 +5034,7 @@
           </p:grpSpPr>
           <p:cxnSp>
             <p:nvCxnSpPr>
-              <p:cNvPr id="87" name="Straight Arrow Connector 86"/>
+              <p:cNvPr id="121" name="Straight Arrow Connector 120"/>
               <p:cNvCxnSpPr/>
               <p:nvPr/>
             </p:nvCxnSpPr>
@@ -5062,7 +5072,7 @@
           </p:cxnSp>
           <p:cxnSp>
             <p:nvCxnSpPr>
-              <p:cNvPr id="88" name="Straight Arrow Connector 87"/>
+              <p:cNvPr id="122" name="Straight Arrow Connector 121"/>
               <p:cNvCxnSpPr/>
               <p:nvPr/>
             </p:nvCxnSpPr>
@@ -5097,7 +5107,7 @@
           </p:cxnSp>
           <p:cxnSp>
             <p:nvCxnSpPr>
-              <p:cNvPr id="89" name="Straight Arrow Connector 88"/>
+              <p:cNvPr id="123" name="Straight Arrow Connector 122"/>
               <p:cNvCxnSpPr/>
               <p:nvPr/>
             </p:nvCxnSpPr>
@@ -5138,13 +5148,13 @@
           <mc:Choice xmlns:a14="http://schemas.microsoft.com/office/drawing/2010/main" Requires="a14">
             <p:sp>
               <p:nvSpPr>
-                <p:cNvPr id="85" name="TextBox 84"/>
+                <p:cNvPr id="119" name="TextBox 118"/>
                 <p:cNvSpPr txBox="1"/>
                 <p:nvPr/>
               </p:nvSpPr>
               <p:spPr>
                 <a:xfrm>
-                  <a:off x="1392160" y="364166"/>
+                  <a:off x="1380892" y="415230"/>
                   <a:ext cx="322213" cy="152490"/>
                 </a:xfrm>
                 <a:prstGeom prst="rect">
@@ -5169,7 +5179,7 @@
                           <m:sSubPr>
                             <m:ctrlPr>
                               <a:rPr lang="en-US" sz="2800" b="0" i="1" smtClean="0">
-                                <a:latin typeface="Cambria Math"/>
+                                <a:latin typeface="Cambria Math" panose="02040503050406030204" pitchFamily="18" charset="0"/>
                               </a:rPr>
                             </m:ctrlPr>
                           </m:sSubPr>
@@ -5201,7 +5211,7 @@
           <mc:Fallback>
             <p:sp>
               <p:nvSpPr>
-                <p:cNvPr id="85" name="TextBox 84"/>
+                <p:cNvPr id="119" name="TextBox 118"/>
                 <p:cNvSpPr txBox="1">
                   <a:spLocks noRot="1" noChangeAspect="1" noMove="1" noResize="1" noEditPoints="1" noAdjustHandles="1" noChangeArrowheads="1" noChangeShapeType="1" noTextEdit="1"/>
                 </p:cNvSpPr>
@@ -5209,13 +5219,13 @@
               </p:nvSpPr>
               <p:spPr>
                 <a:xfrm>
-                  <a:off x="1392160" y="364166"/>
+                  <a:off x="1380892" y="415230"/>
                   <a:ext cx="322213" cy="152490"/>
                 </a:xfrm>
                 <a:prstGeom prst="rect">
                   <a:avLst/>
                 </a:prstGeom>
-                <a:blipFill rotWithShape="1">
+                <a:blipFill rotWithShape="0">
                   <a:blip r:embed="rId9"/>
                   <a:stretch>
                     <a:fillRect/>
@@ -5237,17 +5247,17 @@
             </p:sp>
           </mc:Fallback>
         </mc:AlternateContent>
-        <mc:AlternateContent xmlns:mc="http://schemas.openxmlformats.org/markup-compatibility/2006" xmlns:a14="http://schemas.microsoft.com/office/drawing/2010/main">
-          <mc:Choice Requires="a14">
+        <mc:AlternateContent xmlns:mc="http://schemas.openxmlformats.org/markup-compatibility/2006">
+          <mc:Choice xmlns:a14="http://schemas.microsoft.com/office/drawing/2010/main" Requires="a14">
             <p:sp>
               <p:nvSpPr>
-                <p:cNvPr id="86" name="TextBox 85"/>
+                <p:cNvPr id="120" name="TextBox 119"/>
                 <p:cNvSpPr txBox="1"/>
                 <p:nvPr/>
               </p:nvSpPr>
               <p:spPr>
                 <a:xfrm>
-                  <a:off x="1272600" y="897075"/>
+                  <a:off x="1277518" y="955966"/>
                   <a:ext cx="246672" cy="116610"/>
                 </a:xfrm>
                 <a:prstGeom prst="rect">
@@ -5272,7 +5282,7 @@
                           <m:sSubPr>
                             <m:ctrlPr>
                               <a:rPr lang="en-US" sz="2000" b="0" i="1" smtClean="0">
-                                <a:latin typeface="Cambria Math"/>
+                                <a:latin typeface="Cambria Math" panose="02040503050406030204" pitchFamily="18" charset="0"/>
                               </a:rPr>
                             </m:ctrlPr>
                           </m:sSubPr>
@@ -5301,10 +5311,10 @@
               </p:txBody>
             </p:sp>
           </mc:Choice>
-          <mc:Fallback xmlns="">
+          <mc:Fallback>
             <p:sp>
               <p:nvSpPr>
-                <p:cNvPr id="78" name="TextBox 77"/>
+                <p:cNvPr id="120" name="TextBox 119"/>
                 <p:cNvSpPr txBox="1">
                   <a:spLocks noRot="1" noChangeAspect="1" noMove="1" noResize="1" noEditPoints="1" noAdjustHandles="1" noChangeArrowheads="1" noChangeShapeType="1" noTextEdit="1"/>
                 </p:cNvSpPr>
@@ -5312,8 +5322,8 @@
               </p:nvSpPr>
               <p:spPr>
                 <a:xfrm>
-                  <a:off x="1272600" y="897075"/>
-                  <a:ext cx="246672" cy="184666"/>
+                  <a:off x="1277518" y="955966"/>
+                  <a:ext cx="246672" cy="116610"/>
                 </a:xfrm>
                 <a:prstGeom prst="rect">
                   <a:avLst/>
@@ -5341,6 +5351,459 @@
           </mc:Fallback>
         </mc:AlternateContent>
       </p:grpSp>
+      <p:sp>
+        <p:nvSpPr>
+          <p:cNvPr id="2" name="Flowchart: Summing Junction 1"/>
+          <p:cNvSpPr/>
+          <p:nvPr/>
+        </p:nvSpPr>
+        <p:spPr>
+          <a:xfrm>
+            <a:off x="6795010" y="3795553"/>
+            <a:ext cx="291357" cy="291357"/>
+          </a:xfrm>
+          <a:prstGeom prst="flowChartSummingJunction">
+            <a:avLst/>
+          </a:prstGeom>
+          <a:noFill/>
+          <a:ln>
+            <a:solidFill>
+              <a:schemeClr val="tx1"/>
+            </a:solidFill>
+          </a:ln>
+        </p:spPr>
+        <p:style>
+          <a:lnRef idx="2">
+            <a:schemeClr val="accent1">
+              <a:shade val="50000"/>
+            </a:schemeClr>
+          </a:lnRef>
+          <a:fillRef idx="1">
+            <a:schemeClr val="accent1"/>
+          </a:fillRef>
+          <a:effectRef idx="0">
+            <a:schemeClr val="accent1"/>
+          </a:effectRef>
+          <a:fontRef idx="minor">
+            <a:schemeClr val="lt1"/>
+          </a:fontRef>
+        </p:style>
+        <p:txBody>
+          <a:bodyPr rtlCol="0" anchor="ctr"/>
+          <a:lstStyle/>
+          <a:p>
+            <a:pPr algn="ctr"/>
+            <a:endParaRPr lang="en-US"/>
+          </a:p>
+        </p:txBody>
+      </p:sp>
+      <p:sp>
+        <p:nvSpPr>
+          <p:cNvPr id="143" name="Flowchart: Summing Junction 142"/>
+          <p:cNvSpPr/>
+          <p:nvPr/>
+        </p:nvSpPr>
+        <p:spPr>
+          <a:xfrm>
+            <a:off x="4240922" y="4732034"/>
+            <a:ext cx="148811" cy="148811"/>
+          </a:xfrm>
+          <a:prstGeom prst="flowChartSummingJunction">
+            <a:avLst/>
+          </a:prstGeom>
+          <a:noFill/>
+          <a:ln>
+            <a:solidFill>
+              <a:schemeClr val="tx1"/>
+            </a:solidFill>
+          </a:ln>
+        </p:spPr>
+        <p:style>
+          <a:lnRef idx="2">
+            <a:schemeClr val="accent1">
+              <a:shade val="50000"/>
+            </a:schemeClr>
+          </a:lnRef>
+          <a:fillRef idx="1">
+            <a:schemeClr val="accent1"/>
+          </a:fillRef>
+          <a:effectRef idx="0">
+            <a:schemeClr val="accent1"/>
+          </a:effectRef>
+          <a:fontRef idx="minor">
+            <a:schemeClr val="lt1"/>
+          </a:fontRef>
+        </p:style>
+        <p:txBody>
+          <a:bodyPr rtlCol="0" anchor="ctr"/>
+          <a:lstStyle/>
+          <a:p>
+            <a:pPr algn="ctr"/>
+            <a:endParaRPr lang="en-US"/>
+          </a:p>
+        </p:txBody>
+      </p:sp>
+      <p:sp>
+        <p:nvSpPr>
+          <p:cNvPr id="145" name="Flowchart: Summing Junction 144"/>
+          <p:cNvSpPr/>
+          <p:nvPr/>
+        </p:nvSpPr>
+        <p:spPr>
+          <a:xfrm>
+            <a:off x="2233126" y="6483712"/>
+            <a:ext cx="148811" cy="148811"/>
+          </a:xfrm>
+          <a:prstGeom prst="flowChartSummingJunction">
+            <a:avLst/>
+          </a:prstGeom>
+          <a:noFill/>
+          <a:ln>
+            <a:solidFill>
+              <a:schemeClr val="tx1"/>
+            </a:solidFill>
+          </a:ln>
+        </p:spPr>
+        <p:style>
+          <a:lnRef idx="2">
+            <a:schemeClr val="accent1">
+              <a:shade val="50000"/>
+            </a:schemeClr>
+          </a:lnRef>
+          <a:fillRef idx="1">
+            <a:schemeClr val="accent1"/>
+          </a:fillRef>
+          <a:effectRef idx="0">
+            <a:schemeClr val="accent1"/>
+          </a:effectRef>
+          <a:fontRef idx="minor">
+            <a:schemeClr val="lt1"/>
+          </a:fontRef>
+        </p:style>
+        <p:txBody>
+          <a:bodyPr rtlCol="0" anchor="ctr"/>
+          <a:lstStyle/>
+          <a:p>
+            <a:pPr algn="ctr"/>
+            <a:endParaRPr lang="en-US"/>
+          </a:p>
+        </p:txBody>
+      </p:sp>
+      <p:sp>
+        <p:nvSpPr>
+          <p:cNvPr id="146" name="Flowchart: Summing Junction 145"/>
+          <p:cNvSpPr/>
+          <p:nvPr/>
+        </p:nvSpPr>
+        <p:spPr>
+          <a:xfrm>
+            <a:off x="11479425" y="5899281"/>
+            <a:ext cx="148811" cy="148811"/>
+          </a:xfrm>
+          <a:prstGeom prst="flowChartSummingJunction">
+            <a:avLst/>
+          </a:prstGeom>
+          <a:noFill/>
+          <a:ln>
+            <a:solidFill>
+              <a:schemeClr val="tx1"/>
+            </a:solidFill>
+          </a:ln>
+        </p:spPr>
+        <p:style>
+          <a:lnRef idx="2">
+            <a:schemeClr val="accent1">
+              <a:shade val="50000"/>
+            </a:schemeClr>
+          </a:lnRef>
+          <a:fillRef idx="1">
+            <a:schemeClr val="accent1"/>
+          </a:fillRef>
+          <a:effectRef idx="0">
+            <a:schemeClr val="accent1"/>
+          </a:effectRef>
+          <a:fontRef idx="minor">
+            <a:schemeClr val="lt1"/>
+          </a:fontRef>
+        </p:style>
+        <p:txBody>
+          <a:bodyPr rtlCol="0" anchor="ctr"/>
+          <a:lstStyle/>
+          <a:p>
+            <a:pPr algn="ctr"/>
+            <a:endParaRPr lang="en-US"/>
+          </a:p>
+        </p:txBody>
+      </p:sp>
+      <p:sp>
+        <p:nvSpPr>
+          <p:cNvPr id="147" name="Flowchart: Summing Junction 146"/>
+          <p:cNvSpPr/>
+          <p:nvPr/>
+        </p:nvSpPr>
+        <p:spPr>
+          <a:xfrm>
+            <a:off x="11097333" y="7750240"/>
+            <a:ext cx="148811" cy="148811"/>
+          </a:xfrm>
+          <a:prstGeom prst="flowChartSummingJunction">
+            <a:avLst/>
+          </a:prstGeom>
+          <a:noFill/>
+          <a:ln>
+            <a:solidFill>
+              <a:schemeClr val="tx1"/>
+            </a:solidFill>
+          </a:ln>
+        </p:spPr>
+        <p:style>
+          <a:lnRef idx="2">
+            <a:schemeClr val="accent1">
+              <a:shade val="50000"/>
+            </a:schemeClr>
+          </a:lnRef>
+          <a:fillRef idx="1">
+            <a:schemeClr val="accent1"/>
+          </a:fillRef>
+          <a:effectRef idx="0">
+            <a:schemeClr val="accent1"/>
+          </a:effectRef>
+          <a:fontRef idx="minor">
+            <a:schemeClr val="lt1"/>
+          </a:fontRef>
+        </p:style>
+        <p:txBody>
+          <a:bodyPr rtlCol="0" anchor="ctr"/>
+          <a:lstStyle/>
+          <a:p>
+            <a:pPr algn="ctr"/>
+            <a:endParaRPr lang="en-US"/>
+          </a:p>
+        </p:txBody>
+      </p:sp>
+      <p:cxnSp>
+        <p:nvCxnSpPr>
+          <p:cNvPr id="5" name="Straight Arrow Connector 4"/>
+          <p:cNvCxnSpPr/>
+          <p:nvPr/>
+        </p:nvCxnSpPr>
+        <p:spPr>
+          <a:xfrm flipH="1" flipV="1">
+            <a:off x="5208640" y="3744711"/>
+            <a:ext cx="372119" cy="179259"/>
+          </a:xfrm>
+          <a:prstGeom prst="straightConnector1">
+            <a:avLst/>
+          </a:prstGeom>
+          <a:ln>
+            <a:solidFill>
+              <a:schemeClr val="tx1"/>
+            </a:solidFill>
+            <a:tailEnd type="triangle"/>
+          </a:ln>
+        </p:spPr>
+        <p:style>
+          <a:lnRef idx="1">
+            <a:schemeClr val="accent1"/>
+          </a:lnRef>
+          <a:fillRef idx="0">
+            <a:schemeClr val="accent1"/>
+          </a:fillRef>
+          <a:effectRef idx="0">
+            <a:schemeClr val="accent1"/>
+          </a:effectRef>
+          <a:fontRef idx="minor">
+            <a:schemeClr val="tx1"/>
+          </a:fontRef>
+        </p:style>
+      </p:cxnSp>
+      <p:cxnSp>
+        <p:nvCxnSpPr>
+          <p:cNvPr id="148" name="Straight Arrow Connector 147"/>
+          <p:cNvCxnSpPr/>
+          <p:nvPr/>
+        </p:nvCxnSpPr>
+        <p:spPr>
+          <a:xfrm>
+            <a:off x="7989552" y="4616894"/>
+            <a:ext cx="272589" cy="131395"/>
+          </a:xfrm>
+          <a:prstGeom prst="straightConnector1">
+            <a:avLst/>
+          </a:prstGeom>
+          <a:ln>
+            <a:solidFill>
+              <a:schemeClr val="tx1"/>
+            </a:solidFill>
+            <a:tailEnd type="triangle"/>
+          </a:ln>
+        </p:spPr>
+        <p:style>
+          <a:lnRef idx="1">
+            <a:schemeClr val="accent1"/>
+          </a:lnRef>
+          <a:fillRef idx="0">
+            <a:schemeClr val="accent1"/>
+          </a:fillRef>
+          <a:effectRef idx="0">
+            <a:schemeClr val="accent1"/>
+          </a:effectRef>
+          <a:fontRef idx="minor">
+            <a:schemeClr val="tx1"/>
+          </a:fontRef>
+        </p:style>
+      </p:cxnSp>
+      <mc:AlternateContent xmlns:mc="http://schemas.openxmlformats.org/markup-compatibility/2006">
+        <mc:Choice xmlns:a14="http://schemas.microsoft.com/office/drawing/2010/main" Requires="a14">
+          <p:sp>
+            <p:nvSpPr>
+              <p:cNvPr id="149" name="TextBox 148"/>
+              <p:cNvSpPr txBox="1"/>
+              <p:nvPr/>
+            </p:nvSpPr>
+            <p:spPr>
+              <a:xfrm>
+                <a:off x="8855227" y="3027307"/>
+                <a:ext cx="659309" cy="413513"/>
+              </a:xfrm>
+              <a:prstGeom prst="rect">
+                <a:avLst/>
+              </a:prstGeom>
+              <a:noFill/>
+            </p:spPr>
+            <p:txBody>
+              <a:bodyPr wrap="square" rtlCol="0">
+                <a:spAutoFit/>
+              </a:bodyPr>
+              <a:lstStyle/>
+              <a:p>
+                <a:pPr/>
+                <a14:m>
+                  <m:oMathPara xmlns:m="http://schemas.openxmlformats.org/officeDocument/2006/math">
+                    <m:oMathParaPr>
+                      <m:jc m:val="centerGroup"/>
+                    </m:oMathParaPr>
+                    <m:oMath xmlns:m="http://schemas.openxmlformats.org/officeDocument/2006/math">
+                      <m:sSub>
+                        <m:sSubPr>
+                          <m:ctrlPr>
+                            <a:rPr lang="en-US" sz="2000" b="0" i="1" smtClean="0">
+                              <a:latin typeface="Cambria Math" panose="02040503050406030204" pitchFamily="18" charset="0"/>
+                            </a:rPr>
+                          </m:ctrlPr>
+                        </m:sSubPr>
+                        <m:e>
+                          <m:r>
+                            <a:rPr lang="en-US" sz="2000" b="0" i="1" smtClean="0">
+                              <a:latin typeface="Cambria Math"/>
+                            </a:rPr>
+                            <m:t>𝑂</m:t>
+                          </m:r>
+                        </m:e>
+                        <m:sub>
+                          <m:r>
+                            <a:rPr lang="en-US" sz="2000" b="0" i="1" smtClean="0">
+                              <a:latin typeface="Cambria Math" panose="02040503050406030204" pitchFamily="18" charset="0"/>
+                            </a:rPr>
+                            <m:t>3</m:t>
+                          </m:r>
+                          <m:r>
+                            <a:rPr lang="en-US" sz="2000" b="0" i="1" smtClean="0">
+                              <a:latin typeface="Cambria Math"/>
+                            </a:rPr>
+                            <m:t>,</m:t>
+                          </m:r>
+                          <m:r>
+                            <a:rPr lang="en-US" sz="2000" b="0" i="1" smtClean="0">
+                              <a:latin typeface="Cambria Math" panose="02040503050406030204" pitchFamily="18" charset="0"/>
+                            </a:rPr>
+                            <m:t>0</m:t>
+                          </m:r>
+                        </m:sub>
+                      </m:sSub>
+                    </m:oMath>
+                  </m:oMathPara>
+                </a14:m>
+                <a:endParaRPr lang="en-US" sz="2000" dirty="0"/>
+              </a:p>
+            </p:txBody>
+          </p:sp>
+        </mc:Choice>
+        <mc:Fallback>
+          <p:sp>
+            <p:nvSpPr>
+              <p:cNvPr id="149" name="TextBox 148"/>
+              <p:cNvSpPr txBox="1">
+                <a:spLocks noRot="1" noChangeAspect="1" noMove="1" noResize="1" noEditPoints="1" noAdjustHandles="1" noChangeArrowheads="1" noChangeShapeType="1" noTextEdit="1"/>
+              </p:cNvSpPr>
+              <p:nvPr/>
+            </p:nvSpPr>
+            <p:spPr>
+              <a:xfrm>
+                <a:off x="8855227" y="3027307"/>
+                <a:ext cx="659309" cy="413513"/>
+              </a:xfrm>
+              <a:prstGeom prst="rect">
+                <a:avLst/>
+              </a:prstGeom>
+              <a:blipFill rotWithShape="0">
+                <a:blip r:embed="rId11"/>
+                <a:stretch>
+                  <a:fillRect/>
+                </a:stretch>
+              </a:blipFill>
+            </p:spPr>
+            <p:txBody>
+              <a:bodyPr/>
+              <a:lstStyle/>
+              <a:p>
+                <a:r>
+                  <a:rPr lang="en-US">
+                    <a:noFill/>
+                  </a:rPr>
+                  <a:t> </a:t>
+                </a:r>
+              </a:p>
+            </p:txBody>
+          </p:sp>
+        </mc:Fallback>
+      </mc:AlternateContent>
+      <p:cxnSp>
+        <p:nvCxnSpPr>
+          <p:cNvPr id="150" name="Straight Arrow Connector 149"/>
+          <p:cNvCxnSpPr/>
+          <p:nvPr/>
+        </p:nvCxnSpPr>
+        <p:spPr>
+          <a:xfrm flipH="1">
+            <a:off x="9067041" y="3353569"/>
+            <a:ext cx="759" cy="575862"/>
+          </a:xfrm>
+          <a:prstGeom prst="straightConnector1">
+            <a:avLst/>
+          </a:prstGeom>
+          <a:ln>
+            <a:solidFill>
+              <a:schemeClr val="tx1"/>
+            </a:solidFill>
+            <a:tailEnd type="triangle"/>
+          </a:ln>
+        </p:spPr>
+        <p:style>
+          <a:lnRef idx="1">
+            <a:schemeClr val="accent1"/>
+          </a:lnRef>
+          <a:fillRef idx="0">
+            <a:schemeClr val="accent1"/>
+          </a:fillRef>
+          <a:effectRef idx="0">
+            <a:schemeClr val="accent1"/>
+          </a:effectRef>
+          <a:fontRef idx="minor">
+            <a:schemeClr val="tx1"/>
+          </a:fontRef>
+        </p:style>
+      </p:cxnSp>
     </p:spTree>
     <p:extLst>
       <p:ext uri="{BB962C8B-B14F-4D97-AF65-F5344CB8AC3E}">

</xml_diff>

<commit_message>
minor report corr; working on presentation
</commit_message>
<xml_diff>
--- a/coordinate_frames.pptx
+++ b/coordinate_frames.pptx
@@ -4,6 +4,9 @@
   <p:sldMasterIdLst>
     <p:sldMasterId id="2147483648" r:id="rId1"/>
   </p:sldMasterIdLst>
+  <p:notesMasterIdLst>
+    <p:notesMasterId r:id="rId3"/>
+  </p:notesMasterIdLst>
   <p:sldIdLst>
     <p:sldId id="256" r:id="rId2"/>
   </p:sldIdLst>
@@ -133,6 +136,440 @@
 </p:presentation>
 </file>
 
+<file path=ppt/notesMasters/notesMaster1.xml><?xml version="1.0" encoding="utf-8"?>
+<p:notesMaster xmlns:a="http://schemas.openxmlformats.org/drawingml/2006/main" xmlns:r="http://schemas.openxmlformats.org/officeDocument/2006/relationships" xmlns:p="http://schemas.openxmlformats.org/presentationml/2006/main">
+  <p:cSld>
+    <p:bg>
+      <p:bgRef idx="1001">
+        <a:schemeClr val="bg1"/>
+      </p:bgRef>
+    </p:bg>
+    <p:spTree>
+      <p:nvGrpSpPr>
+        <p:cNvPr id="1" name=""/>
+        <p:cNvGrpSpPr/>
+        <p:nvPr/>
+      </p:nvGrpSpPr>
+      <p:grpSpPr>
+        <a:xfrm>
+          <a:off x="0" y="0"/>
+          <a:ext cx="0" cy="0"/>
+          <a:chOff x="0" y="0"/>
+          <a:chExt cx="0" cy="0"/>
+        </a:xfrm>
+      </p:grpSpPr>
+      <p:sp>
+        <p:nvSpPr>
+          <p:cNvPr id="2" name="Header Placeholder 1"/>
+          <p:cNvSpPr>
+            <a:spLocks noGrp="1"/>
+          </p:cNvSpPr>
+          <p:nvPr>
+            <p:ph type="hdr" sz="quarter"/>
+          </p:nvPr>
+        </p:nvSpPr>
+        <p:spPr>
+          <a:xfrm>
+            <a:off x="0" y="0"/>
+            <a:ext cx="2971800" cy="458788"/>
+          </a:xfrm>
+          <a:prstGeom prst="rect">
+            <a:avLst/>
+          </a:prstGeom>
+        </p:spPr>
+        <p:txBody>
+          <a:bodyPr vert="horz" lIns="91440" tIns="45720" rIns="91440" bIns="45720" rtlCol="0"/>
+          <a:lstStyle>
+            <a:lvl1pPr algn="l">
+              <a:defRPr sz="1200"/>
+            </a:lvl1pPr>
+          </a:lstStyle>
+          <a:p>
+            <a:endParaRPr lang="en-US"/>
+          </a:p>
+        </p:txBody>
+      </p:sp>
+      <p:sp>
+        <p:nvSpPr>
+          <p:cNvPr id="3" name="Date Placeholder 2"/>
+          <p:cNvSpPr>
+            <a:spLocks noGrp="1"/>
+          </p:cNvSpPr>
+          <p:nvPr>
+            <p:ph type="dt" idx="1"/>
+          </p:nvPr>
+        </p:nvSpPr>
+        <p:spPr>
+          <a:xfrm>
+            <a:off x="3884613" y="0"/>
+            <a:ext cx="2971800" cy="458788"/>
+          </a:xfrm>
+          <a:prstGeom prst="rect">
+            <a:avLst/>
+          </a:prstGeom>
+        </p:spPr>
+        <p:txBody>
+          <a:bodyPr vert="horz" lIns="91440" tIns="45720" rIns="91440" bIns="45720" rtlCol="0"/>
+          <a:lstStyle>
+            <a:lvl1pPr algn="r">
+              <a:defRPr sz="1200"/>
+            </a:lvl1pPr>
+          </a:lstStyle>
+          <a:p>
+            <a:fld id="{C37651A0-0413-40C3-BF99-FA3A5CCFC008}" type="datetimeFigureOut">
+              <a:rPr lang="en-US" smtClean="0"/>
+              <a:t>5/12/2015</a:t>
+            </a:fld>
+            <a:endParaRPr lang="en-US"/>
+          </a:p>
+        </p:txBody>
+      </p:sp>
+      <p:sp>
+        <p:nvSpPr>
+          <p:cNvPr id="4" name="Slide Image Placeholder 3"/>
+          <p:cNvSpPr>
+            <a:spLocks noGrp="1" noRot="1" noChangeAspect="1"/>
+          </p:cNvSpPr>
+          <p:nvPr>
+            <p:ph type="sldImg" idx="2"/>
+          </p:nvPr>
+        </p:nvSpPr>
+        <p:spPr>
+          <a:xfrm>
+            <a:off x="1114425" y="1143000"/>
+            <a:ext cx="4629150" cy="3086100"/>
+          </a:xfrm>
+          <a:prstGeom prst="rect">
+            <a:avLst/>
+          </a:prstGeom>
+          <a:noFill/>
+          <a:ln w="12700">
+            <a:solidFill>
+              <a:prstClr val="black"/>
+            </a:solidFill>
+          </a:ln>
+        </p:spPr>
+        <p:txBody>
+          <a:bodyPr vert="horz" lIns="91440" tIns="45720" rIns="91440" bIns="45720" rtlCol="0" anchor="ctr"/>
+          <a:lstStyle/>
+          <a:p>
+            <a:endParaRPr lang="en-US"/>
+          </a:p>
+        </p:txBody>
+      </p:sp>
+      <p:sp>
+        <p:nvSpPr>
+          <p:cNvPr id="5" name="Notes Placeholder 4"/>
+          <p:cNvSpPr>
+            <a:spLocks noGrp="1"/>
+          </p:cNvSpPr>
+          <p:nvPr>
+            <p:ph type="body" sz="quarter" idx="3"/>
+          </p:nvPr>
+        </p:nvSpPr>
+        <p:spPr>
+          <a:xfrm>
+            <a:off x="685800" y="4400550"/>
+            <a:ext cx="5486400" cy="3600450"/>
+          </a:xfrm>
+          <a:prstGeom prst="rect">
+            <a:avLst/>
+          </a:prstGeom>
+        </p:spPr>
+        <p:txBody>
+          <a:bodyPr vert="horz" lIns="91440" tIns="45720" rIns="91440" bIns="45720" rtlCol="0"/>
+          <a:lstStyle/>
+          <a:p>
+            <a:pPr lvl="0"/>
+            <a:r>
+              <a:rPr lang="en-US" smtClean="0"/>
+              <a:t>Click to edit Master text styles</a:t>
+            </a:r>
+          </a:p>
+          <a:p>
+            <a:pPr lvl="1"/>
+            <a:r>
+              <a:rPr lang="en-US" smtClean="0"/>
+              <a:t>Second level</a:t>
+            </a:r>
+          </a:p>
+          <a:p>
+            <a:pPr lvl="2"/>
+            <a:r>
+              <a:rPr lang="en-US" smtClean="0"/>
+              <a:t>Third level</a:t>
+            </a:r>
+          </a:p>
+          <a:p>
+            <a:pPr lvl="3"/>
+            <a:r>
+              <a:rPr lang="en-US" smtClean="0"/>
+              <a:t>Fourth level</a:t>
+            </a:r>
+          </a:p>
+          <a:p>
+            <a:pPr lvl="4"/>
+            <a:r>
+              <a:rPr lang="en-US" smtClean="0"/>
+              <a:t>Fifth level</a:t>
+            </a:r>
+            <a:endParaRPr lang="en-US"/>
+          </a:p>
+        </p:txBody>
+      </p:sp>
+      <p:sp>
+        <p:nvSpPr>
+          <p:cNvPr id="6" name="Footer Placeholder 5"/>
+          <p:cNvSpPr>
+            <a:spLocks noGrp="1"/>
+          </p:cNvSpPr>
+          <p:nvPr>
+            <p:ph type="ftr" sz="quarter" idx="4"/>
+          </p:nvPr>
+        </p:nvSpPr>
+        <p:spPr>
+          <a:xfrm>
+            <a:off x="0" y="8685213"/>
+            <a:ext cx="2971800" cy="458787"/>
+          </a:xfrm>
+          <a:prstGeom prst="rect">
+            <a:avLst/>
+          </a:prstGeom>
+        </p:spPr>
+        <p:txBody>
+          <a:bodyPr vert="horz" lIns="91440" tIns="45720" rIns="91440" bIns="45720" rtlCol="0" anchor="b"/>
+          <a:lstStyle>
+            <a:lvl1pPr algn="l">
+              <a:defRPr sz="1200"/>
+            </a:lvl1pPr>
+          </a:lstStyle>
+          <a:p>
+            <a:endParaRPr lang="en-US"/>
+          </a:p>
+        </p:txBody>
+      </p:sp>
+      <p:sp>
+        <p:nvSpPr>
+          <p:cNvPr id="7" name="Slide Number Placeholder 6"/>
+          <p:cNvSpPr>
+            <a:spLocks noGrp="1"/>
+          </p:cNvSpPr>
+          <p:nvPr>
+            <p:ph type="sldNum" sz="quarter" idx="5"/>
+          </p:nvPr>
+        </p:nvSpPr>
+        <p:spPr>
+          <a:xfrm>
+            <a:off x="3884613" y="8685213"/>
+            <a:ext cx="2971800" cy="458787"/>
+          </a:xfrm>
+          <a:prstGeom prst="rect">
+            <a:avLst/>
+          </a:prstGeom>
+        </p:spPr>
+        <p:txBody>
+          <a:bodyPr vert="horz" lIns="91440" tIns="45720" rIns="91440" bIns="45720" rtlCol="0" anchor="b"/>
+          <a:lstStyle>
+            <a:lvl1pPr algn="r">
+              <a:defRPr sz="1200"/>
+            </a:lvl1pPr>
+          </a:lstStyle>
+          <a:p>
+            <a:fld id="{1E47C449-6A88-427B-AF32-B8F5DFEB15DC}" type="slidenum">
+              <a:rPr lang="en-US" smtClean="0"/>
+              <a:t>‹#›</a:t>
+            </a:fld>
+            <a:endParaRPr lang="en-US"/>
+          </a:p>
+        </p:txBody>
+      </p:sp>
+    </p:spTree>
+    <p:extLst>
+      <p:ext uri="{BB962C8B-B14F-4D97-AF65-F5344CB8AC3E}">
+        <p14:creationId xmlns:p14="http://schemas.microsoft.com/office/powerpoint/2010/main" val="1289726542"/>
+      </p:ext>
+    </p:extLst>
+  </p:cSld>
+  <p:clrMap bg1="lt1" tx1="dk1" bg2="lt2" tx2="dk2" accent1="accent1" accent2="accent2" accent3="accent3" accent4="accent4" accent5="accent5" accent6="accent6" hlink="hlink" folHlink="folHlink"/>
+  <p:notesStyle>
+    <a:lvl1pPr marL="0" algn="l" defTabSz="914400" rtl="0" eaLnBrk="1" latinLnBrk="0" hangingPunct="1">
+      <a:defRPr sz="1200" kern="1200">
+        <a:solidFill>
+          <a:schemeClr val="tx1"/>
+        </a:solidFill>
+        <a:latin typeface="+mn-lt"/>
+        <a:ea typeface="+mn-ea"/>
+        <a:cs typeface="+mn-cs"/>
+      </a:defRPr>
+    </a:lvl1pPr>
+    <a:lvl2pPr marL="457200" algn="l" defTabSz="914400" rtl="0" eaLnBrk="1" latinLnBrk="0" hangingPunct="1">
+      <a:defRPr sz="1200" kern="1200">
+        <a:solidFill>
+          <a:schemeClr val="tx1"/>
+        </a:solidFill>
+        <a:latin typeface="+mn-lt"/>
+        <a:ea typeface="+mn-ea"/>
+        <a:cs typeface="+mn-cs"/>
+      </a:defRPr>
+    </a:lvl2pPr>
+    <a:lvl3pPr marL="914400" algn="l" defTabSz="914400" rtl="0" eaLnBrk="1" latinLnBrk="0" hangingPunct="1">
+      <a:defRPr sz="1200" kern="1200">
+        <a:solidFill>
+          <a:schemeClr val="tx1"/>
+        </a:solidFill>
+        <a:latin typeface="+mn-lt"/>
+        <a:ea typeface="+mn-ea"/>
+        <a:cs typeface="+mn-cs"/>
+      </a:defRPr>
+    </a:lvl3pPr>
+    <a:lvl4pPr marL="1371600" algn="l" defTabSz="914400" rtl="0" eaLnBrk="1" latinLnBrk="0" hangingPunct="1">
+      <a:defRPr sz="1200" kern="1200">
+        <a:solidFill>
+          <a:schemeClr val="tx1"/>
+        </a:solidFill>
+        <a:latin typeface="+mn-lt"/>
+        <a:ea typeface="+mn-ea"/>
+        <a:cs typeface="+mn-cs"/>
+      </a:defRPr>
+    </a:lvl4pPr>
+    <a:lvl5pPr marL="1828800" algn="l" defTabSz="914400" rtl="0" eaLnBrk="1" latinLnBrk="0" hangingPunct="1">
+      <a:defRPr sz="1200" kern="1200">
+        <a:solidFill>
+          <a:schemeClr val="tx1"/>
+        </a:solidFill>
+        <a:latin typeface="+mn-lt"/>
+        <a:ea typeface="+mn-ea"/>
+        <a:cs typeface="+mn-cs"/>
+      </a:defRPr>
+    </a:lvl5pPr>
+    <a:lvl6pPr marL="2286000" algn="l" defTabSz="914400" rtl="0" eaLnBrk="1" latinLnBrk="0" hangingPunct="1">
+      <a:defRPr sz="1200" kern="1200">
+        <a:solidFill>
+          <a:schemeClr val="tx1"/>
+        </a:solidFill>
+        <a:latin typeface="+mn-lt"/>
+        <a:ea typeface="+mn-ea"/>
+        <a:cs typeface="+mn-cs"/>
+      </a:defRPr>
+    </a:lvl6pPr>
+    <a:lvl7pPr marL="2743200" algn="l" defTabSz="914400" rtl="0" eaLnBrk="1" latinLnBrk="0" hangingPunct="1">
+      <a:defRPr sz="1200" kern="1200">
+        <a:solidFill>
+          <a:schemeClr val="tx1"/>
+        </a:solidFill>
+        <a:latin typeface="+mn-lt"/>
+        <a:ea typeface="+mn-ea"/>
+        <a:cs typeface="+mn-cs"/>
+      </a:defRPr>
+    </a:lvl7pPr>
+    <a:lvl8pPr marL="3200400" algn="l" defTabSz="914400" rtl="0" eaLnBrk="1" latinLnBrk="0" hangingPunct="1">
+      <a:defRPr sz="1200" kern="1200">
+        <a:solidFill>
+          <a:schemeClr val="tx1"/>
+        </a:solidFill>
+        <a:latin typeface="+mn-lt"/>
+        <a:ea typeface="+mn-ea"/>
+        <a:cs typeface="+mn-cs"/>
+      </a:defRPr>
+    </a:lvl8pPr>
+    <a:lvl9pPr marL="3657600" algn="l" defTabSz="914400" rtl="0" eaLnBrk="1" latinLnBrk="0" hangingPunct="1">
+      <a:defRPr sz="1200" kern="1200">
+        <a:solidFill>
+          <a:schemeClr val="tx1"/>
+        </a:solidFill>
+        <a:latin typeface="+mn-lt"/>
+        <a:ea typeface="+mn-ea"/>
+        <a:cs typeface="+mn-cs"/>
+      </a:defRPr>
+    </a:lvl9pPr>
+  </p:notesStyle>
+</p:notesMaster>
+</file>
+
+<file path=ppt/notesSlides/notesSlide1.xml><?xml version="1.0" encoding="utf-8"?>
+<p:notes xmlns:a="http://schemas.openxmlformats.org/drawingml/2006/main" xmlns:r="http://schemas.openxmlformats.org/officeDocument/2006/relationships" xmlns:p="http://schemas.openxmlformats.org/presentationml/2006/main">
+  <p:cSld>
+    <p:spTree>
+      <p:nvGrpSpPr>
+        <p:cNvPr id="1" name=""/>
+        <p:cNvGrpSpPr/>
+        <p:nvPr/>
+      </p:nvGrpSpPr>
+      <p:grpSpPr>
+        <a:xfrm>
+          <a:off x="0" y="0"/>
+          <a:ext cx="0" cy="0"/>
+          <a:chOff x="0" y="0"/>
+          <a:chExt cx="0" cy="0"/>
+        </a:xfrm>
+      </p:grpSpPr>
+      <p:sp>
+        <p:nvSpPr>
+          <p:cNvPr id="2" name="Slide Image Placeholder 1"/>
+          <p:cNvSpPr>
+            <a:spLocks noGrp="1" noRot="1" noChangeAspect="1"/>
+          </p:cNvSpPr>
+          <p:nvPr>
+            <p:ph type="sldImg"/>
+          </p:nvPr>
+        </p:nvSpPr>
+        <p:spPr/>
+      </p:sp>
+      <p:sp>
+        <p:nvSpPr>
+          <p:cNvPr id="3" name="Notes Placeholder 2"/>
+          <p:cNvSpPr>
+            <a:spLocks noGrp="1"/>
+          </p:cNvSpPr>
+          <p:nvPr>
+            <p:ph type="body" idx="1"/>
+          </p:nvPr>
+        </p:nvSpPr>
+        <p:spPr/>
+        <p:txBody>
+          <a:bodyPr/>
+          <a:lstStyle/>
+          <a:p>
+            <a:endParaRPr lang="en-US" dirty="0"/>
+          </a:p>
+        </p:txBody>
+      </p:sp>
+      <p:sp>
+        <p:nvSpPr>
+          <p:cNvPr id="4" name="Slide Number Placeholder 3"/>
+          <p:cNvSpPr>
+            <a:spLocks noGrp="1"/>
+          </p:cNvSpPr>
+          <p:nvPr>
+            <p:ph type="sldNum" sz="quarter" idx="10"/>
+          </p:nvPr>
+        </p:nvSpPr>
+        <p:spPr/>
+        <p:txBody>
+          <a:bodyPr/>
+          <a:lstStyle/>
+          <a:p>
+            <a:fld id="{1E47C449-6A88-427B-AF32-B8F5DFEB15DC}" type="slidenum">
+              <a:rPr lang="en-US" smtClean="0"/>
+              <a:t>1</a:t>
+            </a:fld>
+            <a:endParaRPr lang="en-US"/>
+          </a:p>
+        </p:txBody>
+      </p:sp>
+    </p:spTree>
+    <p:extLst>
+      <p:ext uri="{BB962C8B-B14F-4D97-AF65-F5344CB8AC3E}">
+        <p14:creationId xmlns:p14="http://schemas.microsoft.com/office/powerpoint/2010/main" val="2047549309"/>
+      </p:ext>
+    </p:extLst>
+  </p:cSld>
+  <p:clrMapOvr>
+    <a:masterClrMapping/>
+  </p:clrMapOvr>
+</p:notes>
+</file>
+
 <file path=ppt/slideLayouts/slideLayout1.xml><?xml version="1.0" encoding="utf-8"?>
 <p:sldLayout xmlns:a="http://schemas.openxmlformats.org/drawingml/2006/main" xmlns:r="http://schemas.openxmlformats.org/officeDocument/2006/relationships" xmlns:p="http://schemas.openxmlformats.org/presentationml/2006/main" type="title" preserve="1">
   <p:cSld name="Title Slide">
@@ -314,7 +751,7 @@
           <a:p>
             <a:fld id="{5064B7A2-D91B-45A0-9A08-FA3D47D35952}" type="datetimeFigureOut">
               <a:rPr lang="en-US" smtClean="0"/>
-              <a:t>4/27/2015</a:t>
+              <a:t>5/12/2015</a:t>
             </a:fld>
             <a:endParaRPr lang="en-US"/>
           </a:p>
@@ -484,7 +921,7 @@
           <a:p>
             <a:fld id="{5064B7A2-D91B-45A0-9A08-FA3D47D35952}" type="datetimeFigureOut">
               <a:rPr lang="en-US" smtClean="0"/>
-              <a:t>4/27/2015</a:t>
+              <a:t>5/12/2015</a:t>
             </a:fld>
             <a:endParaRPr lang="en-US"/>
           </a:p>
@@ -664,7 +1101,7 @@
           <a:p>
             <a:fld id="{5064B7A2-D91B-45A0-9A08-FA3D47D35952}" type="datetimeFigureOut">
               <a:rPr lang="en-US" smtClean="0"/>
-              <a:t>4/27/2015</a:t>
+              <a:t>5/12/2015</a:t>
             </a:fld>
             <a:endParaRPr lang="en-US"/>
           </a:p>
@@ -834,7 +1271,7 @@
           <a:p>
             <a:fld id="{5064B7A2-D91B-45A0-9A08-FA3D47D35952}" type="datetimeFigureOut">
               <a:rPr lang="en-US" smtClean="0"/>
-              <a:t>4/27/2015</a:t>
+              <a:t>5/12/2015</a:t>
             </a:fld>
             <a:endParaRPr lang="en-US"/>
           </a:p>
@@ -1080,7 +1517,7 @@
           <a:p>
             <a:fld id="{5064B7A2-D91B-45A0-9A08-FA3D47D35952}" type="datetimeFigureOut">
               <a:rPr lang="en-US" smtClean="0"/>
-              <a:t>4/27/2015</a:t>
+              <a:t>5/12/2015</a:t>
             </a:fld>
             <a:endParaRPr lang="en-US"/>
           </a:p>
@@ -1368,7 +1805,7 @@
           <a:p>
             <a:fld id="{5064B7A2-D91B-45A0-9A08-FA3D47D35952}" type="datetimeFigureOut">
               <a:rPr lang="en-US" smtClean="0"/>
-              <a:t>4/27/2015</a:t>
+              <a:t>5/12/2015</a:t>
             </a:fld>
             <a:endParaRPr lang="en-US"/>
           </a:p>
@@ -1790,7 +2227,7 @@
           <a:p>
             <a:fld id="{5064B7A2-D91B-45A0-9A08-FA3D47D35952}" type="datetimeFigureOut">
               <a:rPr lang="en-US" smtClean="0"/>
-              <a:t>4/27/2015</a:t>
+              <a:t>5/12/2015</a:t>
             </a:fld>
             <a:endParaRPr lang="en-US"/>
           </a:p>
@@ -1908,7 +2345,7 @@
           <a:p>
             <a:fld id="{5064B7A2-D91B-45A0-9A08-FA3D47D35952}" type="datetimeFigureOut">
               <a:rPr lang="en-US" smtClean="0"/>
-              <a:t>4/27/2015</a:t>
+              <a:t>5/12/2015</a:t>
             </a:fld>
             <a:endParaRPr lang="en-US"/>
           </a:p>
@@ -2003,7 +2440,7 @@
           <a:p>
             <a:fld id="{5064B7A2-D91B-45A0-9A08-FA3D47D35952}" type="datetimeFigureOut">
               <a:rPr lang="en-US" smtClean="0"/>
-              <a:t>4/27/2015</a:t>
+              <a:t>5/12/2015</a:t>
             </a:fld>
             <a:endParaRPr lang="en-US"/>
           </a:p>
@@ -2280,7 +2717,7 @@
           <a:p>
             <a:fld id="{5064B7A2-D91B-45A0-9A08-FA3D47D35952}" type="datetimeFigureOut">
               <a:rPr lang="en-US" smtClean="0"/>
-              <a:t>4/27/2015</a:t>
+              <a:t>5/12/2015</a:t>
             </a:fld>
             <a:endParaRPr lang="en-US"/>
           </a:p>
@@ -2533,7 +2970,7 @@
           <a:p>
             <a:fld id="{5064B7A2-D91B-45A0-9A08-FA3D47D35952}" type="datetimeFigureOut">
               <a:rPr lang="en-US" smtClean="0"/>
-              <a:t>4/27/2015</a:t>
+              <a:t>5/12/2015</a:t>
             </a:fld>
             <a:endParaRPr lang="en-US"/>
           </a:p>
@@ -2746,7 +3183,7 @@
           <a:p>
             <a:fld id="{5064B7A2-D91B-45A0-9A08-FA3D47D35952}" type="datetimeFigureOut">
               <a:rPr lang="en-US" smtClean="0"/>
-              <a:t>4/27/2015</a:t>
+              <a:t>5/12/2015</a:t>
             </a:fld>
             <a:endParaRPr lang="en-US"/>
           </a:p>
@@ -3730,7 +4167,7 @@
               <a:prstGeom prst="straightConnector1">
                 <a:avLst/>
               </a:prstGeom>
-              <a:ln w="6350">
+              <a:ln w="38100">
                 <a:solidFill>
                   <a:srgbClr val="FF0000"/>
                 </a:solidFill>
@@ -3767,7 +4204,7 @@
               <a:prstGeom prst="straightConnector1">
                 <a:avLst/>
               </a:prstGeom>
-              <a:ln w="6350">
+              <a:ln w="38100">
                 <a:headEnd type="none" w="sm" len="med"/>
                 <a:tailEnd type="triangle" w="sm" len="med"/>
               </a:ln>
@@ -3801,7 +4238,7 @@
               <a:prstGeom prst="straightConnector1">
                 <a:avLst/>
               </a:prstGeom>
-              <a:ln w="6350">
+              <a:ln w="38100">
                 <a:solidFill>
                   <a:srgbClr val="92D050"/>
                 </a:solidFill>
@@ -3988,8 +4425,8 @@
             </p:style>
           </p:cxnSp>
         </p:grpSp>
-        <mc:AlternateContent xmlns:mc="http://schemas.openxmlformats.org/markup-compatibility/2006">
-          <mc:Choice xmlns:a14="http://schemas.microsoft.com/office/drawing/2010/main" Requires="a14">
+        <mc:AlternateContent xmlns:mc="http://schemas.openxmlformats.org/markup-compatibility/2006" xmlns:a14="http://schemas.microsoft.com/office/drawing/2010/main">
+          <mc:Choice Requires="a14">
             <p:sp>
               <p:nvSpPr>
                 <p:cNvPr id="74" name="TextBox 73"/>
@@ -4052,7 +4489,7 @@
               </p:txBody>
             </p:sp>
           </mc:Choice>
-          <mc:Fallback>
+          <mc:Fallback xmlns="">
             <p:sp>
               <p:nvSpPr>
                 <p:cNvPr id="74" name="TextBox 73"/>
@@ -4070,7 +4507,7 @@
                   <a:avLst/>
                 </a:prstGeom>
                 <a:blipFill rotWithShape="0">
-                  <a:blip r:embed="rId2"/>
+                  <a:blip r:embed="rId3"/>
                   <a:stretch>
                     <a:fillRect/>
                   </a:stretch>
@@ -4091,8 +4528,8 @@
             </p:sp>
           </mc:Fallback>
         </mc:AlternateContent>
-        <mc:AlternateContent xmlns:mc="http://schemas.openxmlformats.org/markup-compatibility/2006">
-          <mc:Choice xmlns:a14="http://schemas.microsoft.com/office/drawing/2010/main" Requires="a14">
+        <mc:AlternateContent xmlns:mc="http://schemas.openxmlformats.org/markup-compatibility/2006" xmlns:a14="http://schemas.microsoft.com/office/drawing/2010/main">
+          <mc:Choice Requires="a14">
             <p:sp>
               <p:nvSpPr>
                 <p:cNvPr id="75" name="TextBox 74"/>
@@ -4161,7 +4598,7 @@
               </p:txBody>
             </p:sp>
           </mc:Choice>
-          <mc:Fallback>
+          <mc:Fallback xmlns="">
             <p:sp>
               <p:nvSpPr>
                 <p:cNvPr id="75" name="TextBox 74"/>
@@ -4179,7 +4616,7 @@
                   <a:avLst/>
                 </a:prstGeom>
                 <a:blipFill rotWithShape="0">
-                  <a:blip r:embed="rId3"/>
+                  <a:blip r:embed="rId4"/>
                   <a:stretch>
                     <a:fillRect r="-24000"/>
                   </a:stretch>
@@ -4200,8 +4637,8 @@
             </p:sp>
           </mc:Fallback>
         </mc:AlternateContent>
-        <mc:AlternateContent xmlns:mc="http://schemas.openxmlformats.org/markup-compatibility/2006">
-          <mc:Choice xmlns:a14="http://schemas.microsoft.com/office/drawing/2010/main" Requires="a14">
+        <mc:AlternateContent xmlns:mc="http://schemas.openxmlformats.org/markup-compatibility/2006" xmlns:a14="http://schemas.microsoft.com/office/drawing/2010/main">
+          <mc:Choice Requires="a14">
             <p:sp>
               <p:nvSpPr>
                 <p:cNvPr id="76" name="TextBox 75"/>
@@ -4270,7 +4707,7 @@
               </p:txBody>
             </p:sp>
           </mc:Choice>
-          <mc:Fallback>
+          <mc:Fallback xmlns="">
             <p:sp>
               <p:nvSpPr>
                 <p:cNvPr id="76" name="TextBox 75"/>
@@ -4288,7 +4725,7 @@
                   <a:avLst/>
                 </a:prstGeom>
                 <a:blipFill rotWithShape="0">
-                  <a:blip r:embed="rId4"/>
+                  <a:blip r:embed="rId5"/>
                   <a:stretch>
                     <a:fillRect/>
                   </a:stretch>
@@ -4309,8 +4746,8 @@
             </p:sp>
           </mc:Fallback>
         </mc:AlternateContent>
-        <mc:AlternateContent xmlns:mc="http://schemas.openxmlformats.org/markup-compatibility/2006">
-          <mc:Choice xmlns:a14="http://schemas.microsoft.com/office/drawing/2010/main" Requires="a14">
+        <mc:AlternateContent xmlns:mc="http://schemas.openxmlformats.org/markup-compatibility/2006" xmlns:a14="http://schemas.microsoft.com/office/drawing/2010/main">
+          <mc:Choice Requires="a14">
             <p:sp>
               <p:nvSpPr>
                 <p:cNvPr id="77" name="TextBox 76"/>
@@ -4379,7 +4816,7 @@
               </p:txBody>
             </p:sp>
           </mc:Choice>
-          <mc:Fallback>
+          <mc:Fallback xmlns="">
             <p:sp>
               <p:nvSpPr>
                 <p:cNvPr id="77" name="TextBox 76"/>
@@ -4397,7 +4834,7 @@
                   <a:avLst/>
                 </a:prstGeom>
                 <a:blipFill rotWithShape="0">
-                  <a:blip r:embed="rId5"/>
+                  <a:blip r:embed="rId6"/>
                   <a:stretch>
                     <a:fillRect/>
                   </a:stretch>
@@ -4418,8 +4855,8 @@
             </p:sp>
           </mc:Fallback>
         </mc:AlternateContent>
-        <mc:AlternateContent xmlns:mc="http://schemas.openxmlformats.org/markup-compatibility/2006">
-          <mc:Choice xmlns:a14="http://schemas.microsoft.com/office/drawing/2010/main" Requires="a14">
+        <mc:AlternateContent xmlns:mc="http://schemas.openxmlformats.org/markup-compatibility/2006" xmlns:a14="http://schemas.microsoft.com/office/drawing/2010/main">
+          <mc:Choice Requires="a14">
             <p:sp>
               <p:nvSpPr>
                 <p:cNvPr id="78" name="TextBox 77"/>
@@ -4488,7 +4925,7 @@
               </p:txBody>
             </p:sp>
           </mc:Choice>
-          <mc:Fallback>
+          <mc:Fallback xmlns="">
             <p:sp>
               <p:nvSpPr>
                 <p:cNvPr id="78" name="TextBox 77"/>
@@ -4506,7 +4943,7 @@
                   <a:avLst/>
                 </a:prstGeom>
                 <a:blipFill rotWithShape="0">
-                  <a:blip r:embed="rId6"/>
+                  <a:blip r:embed="rId7"/>
                   <a:stretch>
                     <a:fillRect/>
                   </a:stretch>
@@ -4527,8 +4964,8 @@
             </p:sp>
           </mc:Fallback>
         </mc:AlternateContent>
-        <mc:AlternateContent xmlns:mc="http://schemas.openxmlformats.org/markup-compatibility/2006">
-          <mc:Choice xmlns:a14="http://schemas.microsoft.com/office/drawing/2010/main" Requires="a14">
+        <mc:AlternateContent xmlns:mc="http://schemas.openxmlformats.org/markup-compatibility/2006" xmlns:a14="http://schemas.microsoft.com/office/drawing/2010/main">
+          <mc:Choice Requires="a14">
             <p:sp>
               <p:nvSpPr>
                 <p:cNvPr id="109" name="TextBox 108"/>
@@ -4597,7 +5034,7 @@
               </p:txBody>
             </p:sp>
           </mc:Choice>
-          <mc:Fallback>
+          <mc:Fallback xmlns="">
             <p:sp>
               <p:nvSpPr>
                 <p:cNvPr id="109" name="TextBox 108"/>
@@ -4615,7 +5052,7 @@
                   <a:avLst/>
                 </a:prstGeom>
                 <a:blipFill rotWithShape="0">
-                  <a:blip r:embed="rId7"/>
+                  <a:blip r:embed="rId8"/>
                   <a:stretch>
                     <a:fillRect/>
                   </a:stretch>
@@ -4636,8 +5073,8 @@
             </p:sp>
           </mc:Fallback>
         </mc:AlternateContent>
-        <mc:AlternateContent xmlns:mc="http://schemas.openxmlformats.org/markup-compatibility/2006">
-          <mc:Choice xmlns:a14="http://schemas.microsoft.com/office/drawing/2010/main" Requires="a14">
+        <mc:AlternateContent xmlns:mc="http://schemas.openxmlformats.org/markup-compatibility/2006" xmlns:a14="http://schemas.microsoft.com/office/drawing/2010/main">
+          <mc:Choice Requires="a14">
             <p:sp>
               <p:nvSpPr>
                 <p:cNvPr id="110" name="TextBox 109"/>
@@ -4706,7 +5143,7 @@
               </p:txBody>
             </p:sp>
           </mc:Choice>
-          <mc:Fallback>
+          <mc:Fallback xmlns="">
             <p:sp>
               <p:nvSpPr>
                 <p:cNvPr id="110" name="TextBox 109"/>
@@ -4724,7 +5161,7 @@
                   <a:avLst/>
                 </a:prstGeom>
                 <a:blipFill rotWithShape="0">
-                  <a:blip r:embed="rId8"/>
+                  <a:blip r:embed="rId9"/>
                   <a:stretch>
                     <a:fillRect/>
                   </a:stretch>
@@ -4759,7 +5196,7 @@
             <a:prstGeom prst="straightConnector1">
               <a:avLst/>
             </a:prstGeom>
-            <a:ln w="6350">
+            <a:ln w="38100">
               <a:prstDash val="sysDash"/>
               <a:headEnd type="none" w="sm" len="med"/>
               <a:tailEnd type="triangle" w="sm" len="sm"/>
@@ -4794,7 +5231,7 @@
             <a:prstGeom prst="straightConnector1">
               <a:avLst/>
             </a:prstGeom>
-            <a:ln w="6350">
+            <a:ln w="38100">
               <a:solidFill>
                 <a:srgbClr val="92D050"/>
               </a:solidFill>
@@ -4832,7 +5269,7 @@
             <a:prstGeom prst="straightConnector1">
               <a:avLst/>
             </a:prstGeom>
-            <a:ln w="6350">
+            <a:ln w="38100">
               <a:solidFill>
                 <a:srgbClr val="92D050"/>
               </a:solidFill>
@@ -4918,7 +5355,7 @@
             <a:prstGeom prst="straightConnector1">
               <a:avLst/>
             </a:prstGeom>
-            <a:ln w="6350">
+            <a:ln w="38100">
               <a:solidFill>
                 <a:srgbClr val="FF0000"/>
               </a:solidFill>
@@ -4956,7 +5393,7 @@
             <a:prstGeom prst="straightConnector1">
               <a:avLst/>
             </a:prstGeom>
-            <a:ln w="6350">
+            <a:ln w="38100">
               <a:solidFill>
                 <a:schemeClr val="accent1"/>
               </a:solidFill>
@@ -4994,7 +5431,7 @@
             <a:prstGeom prst="straightConnector1">
               <a:avLst/>
             </a:prstGeom>
-            <a:ln w="6350">
+            <a:ln w="38100">
               <a:solidFill>
                 <a:srgbClr val="FF0000"/>
               </a:solidFill>
@@ -5046,7 +5483,7 @@
               <a:prstGeom prst="straightConnector1">
                 <a:avLst/>
               </a:prstGeom>
-              <a:ln w="6350">
+              <a:ln w="38100">
                 <a:solidFill>
                   <a:srgbClr val="FF0000"/>
                 </a:solidFill>
@@ -5084,7 +5521,7 @@
               <a:prstGeom prst="straightConnector1">
                 <a:avLst/>
               </a:prstGeom>
-              <a:ln w="6350">
+              <a:ln w="38100">
                 <a:prstDash val="sysDash"/>
                 <a:headEnd type="none" w="sm" len="sm"/>
                 <a:tailEnd type="triangle" w="sm" len="med"/>
@@ -5119,7 +5556,7 @@
               <a:prstGeom prst="straightConnector1">
                 <a:avLst/>
               </a:prstGeom>
-              <a:ln w="6350">
+              <a:ln w="38100">
                 <a:solidFill>
                   <a:srgbClr val="92D050"/>
                 </a:solidFill>
@@ -5154,7 +5591,7 @@
               </p:nvSpPr>
               <p:spPr>
                 <a:xfrm>
-                  <a:off x="1380892" y="415230"/>
+                  <a:off x="1162628" y="870149"/>
                   <a:ext cx="322213" cy="152490"/>
                 </a:xfrm>
                 <a:prstGeom prst="rect">
@@ -5219,14 +5656,14 @@
               </p:nvSpPr>
               <p:spPr>
                 <a:xfrm>
-                  <a:off x="1380892" y="415230"/>
+                  <a:off x="1162628" y="870149"/>
                   <a:ext cx="322213" cy="152490"/>
                 </a:xfrm>
                 <a:prstGeom prst="rect">
                   <a:avLst/>
                 </a:prstGeom>
                 <a:blipFill rotWithShape="0">
-                  <a:blip r:embed="rId9"/>
+                  <a:blip r:embed="rId10"/>
                   <a:stretch>
                     <a:fillRect/>
                   </a:stretch>
@@ -5247,8 +5684,8 @@
             </p:sp>
           </mc:Fallback>
         </mc:AlternateContent>
-        <mc:AlternateContent xmlns:mc="http://schemas.openxmlformats.org/markup-compatibility/2006">
-          <mc:Choice xmlns:a14="http://schemas.microsoft.com/office/drawing/2010/main" Requires="a14">
+        <mc:AlternateContent xmlns:mc="http://schemas.openxmlformats.org/markup-compatibility/2006" xmlns:a14="http://schemas.microsoft.com/office/drawing/2010/main">
+          <mc:Choice Requires="a14">
             <p:sp>
               <p:nvSpPr>
                 <p:cNvPr id="120" name="TextBox 119"/>
@@ -5311,7 +5748,7 @@
               </p:txBody>
             </p:sp>
           </mc:Choice>
-          <mc:Fallback>
+          <mc:Fallback xmlns="">
             <p:sp>
               <p:nvSpPr>
                 <p:cNvPr id="120" name="TextBox 119"/>
@@ -5329,7 +5766,7 @@
                   <a:avLst/>
                 </a:prstGeom>
                 <a:blipFill rotWithShape="0">
-                  <a:blip r:embed="rId10"/>
+                  <a:blip r:embed="rId11"/>
                   <a:stretch>
                     <a:fillRect/>
                   </a:stretch>
@@ -5653,8 +6090,8 @@
           </a:fontRef>
         </p:style>
       </p:cxnSp>
-      <mc:AlternateContent xmlns:mc="http://schemas.openxmlformats.org/markup-compatibility/2006">
-        <mc:Choice xmlns:a14="http://schemas.microsoft.com/office/drawing/2010/main" Requires="a14">
+      <mc:AlternateContent xmlns:mc="http://schemas.openxmlformats.org/markup-compatibility/2006" xmlns:a14="http://schemas.microsoft.com/office/drawing/2010/main">
+        <mc:Choice Requires="a14">
           <p:sp>
             <p:nvSpPr>
               <p:cNvPr id="149" name="TextBox 148"/>
@@ -5729,7 +6166,7 @@
             </p:txBody>
           </p:sp>
         </mc:Choice>
-        <mc:Fallback>
+        <mc:Fallback xmlns="">
           <p:sp>
             <p:nvSpPr>
               <p:cNvPr id="149" name="TextBox 148"/>
@@ -5747,7 +6184,7 @@
                 <a:avLst/>
               </a:prstGeom>
               <a:blipFill rotWithShape="0">
-                <a:blip r:embed="rId11"/>
+                <a:blip r:embed="rId12"/>
                 <a:stretch>
                   <a:fillRect/>
                 </a:stretch>
@@ -6100,4 +6537,265 @@
   <a:objectDefaults/>
   <a:extraClrSchemeLst/>
 </a:theme>
+</file>
+
+<file path=ppt/theme/theme2.xml><?xml version="1.0" encoding="utf-8"?>
+<a:theme xmlns:a="http://schemas.openxmlformats.org/drawingml/2006/main" name="Office Theme">
+  <a:themeElements>
+    <a:clrScheme name="Office">
+      <a:dk1>
+        <a:sysClr val="windowText" lastClr="000000"/>
+      </a:dk1>
+      <a:lt1>
+        <a:sysClr val="window" lastClr="FFFFFF"/>
+      </a:lt1>
+      <a:dk2>
+        <a:srgbClr val="44546A"/>
+      </a:dk2>
+      <a:lt2>
+        <a:srgbClr val="E7E6E6"/>
+      </a:lt2>
+      <a:accent1>
+        <a:srgbClr val="5B9BD5"/>
+      </a:accent1>
+      <a:accent2>
+        <a:srgbClr val="ED7D31"/>
+      </a:accent2>
+      <a:accent3>
+        <a:srgbClr val="A5A5A5"/>
+      </a:accent3>
+      <a:accent4>
+        <a:srgbClr val="FFC000"/>
+      </a:accent4>
+      <a:accent5>
+        <a:srgbClr val="4472C4"/>
+      </a:accent5>
+      <a:accent6>
+        <a:srgbClr val="70AD47"/>
+      </a:accent6>
+      <a:hlink>
+        <a:srgbClr val="0563C1"/>
+      </a:hlink>
+      <a:folHlink>
+        <a:srgbClr val="954F72"/>
+      </a:folHlink>
+    </a:clrScheme>
+    <a:fontScheme name="Office">
+      <a:majorFont>
+        <a:latin typeface="Calibri Light" panose="020F0302020204030204"/>
+        <a:ea typeface=""/>
+        <a:cs typeface=""/>
+        <a:font script="Jpan" typeface="ＭＳ Ｐゴシック"/>
+        <a:font script="Hang" typeface="맑은 고딕"/>
+        <a:font script="Hans" typeface="宋体"/>
+        <a:font script="Hant" typeface="新細明體"/>
+        <a:font script="Arab" typeface="Times New Roman"/>
+        <a:font script="Hebr" typeface="Times New Roman"/>
+        <a:font script="Thai" typeface="Angsana New"/>
+        <a:font script="Ethi" typeface="Nyala"/>
+        <a:font script="Beng" typeface="Vrinda"/>
+        <a:font script="Gujr" typeface="Shruti"/>
+        <a:font script="Khmr" typeface="MoolBoran"/>
+        <a:font script="Knda" typeface="Tunga"/>
+        <a:font script="Guru" typeface="Raavi"/>
+        <a:font script="Cans" typeface="Euphemia"/>
+        <a:font script="Cher" typeface="Plantagenet Cherokee"/>
+        <a:font script="Yiii" typeface="Microsoft Yi Baiti"/>
+        <a:font script="Tibt" typeface="Microsoft Himalaya"/>
+        <a:font script="Thaa" typeface="MV Boli"/>
+        <a:font script="Deva" typeface="Mangal"/>
+        <a:font script="Telu" typeface="Gautami"/>
+        <a:font script="Taml" typeface="Latha"/>
+        <a:font script="Syrc" typeface="Estrangelo Edessa"/>
+        <a:font script="Orya" typeface="Kalinga"/>
+        <a:font script="Mlym" typeface="Kartika"/>
+        <a:font script="Laoo" typeface="DokChampa"/>
+        <a:font script="Sinh" typeface="Iskoola Pota"/>
+        <a:font script="Mong" typeface="Mongolian Baiti"/>
+        <a:font script="Viet" typeface="Times New Roman"/>
+        <a:font script="Uigh" typeface="Microsoft Uighur"/>
+        <a:font script="Geor" typeface="Sylfaen"/>
+      </a:majorFont>
+      <a:minorFont>
+        <a:latin typeface="Calibri" panose="020F0502020204030204"/>
+        <a:ea typeface=""/>
+        <a:cs typeface=""/>
+        <a:font script="Jpan" typeface="ＭＳ Ｐゴシック"/>
+        <a:font script="Hang" typeface="맑은 고딕"/>
+        <a:font script="Hans" typeface="宋体"/>
+        <a:font script="Hant" typeface="新細明體"/>
+        <a:font script="Arab" typeface="Arial"/>
+        <a:font script="Hebr" typeface="Arial"/>
+        <a:font script="Thai" typeface="Cordia New"/>
+        <a:font script="Ethi" typeface="Nyala"/>
+        <a:font script="Beng" typeface="Vrinda"/>
+        <a:font script="Gujr" typeface="Shruti"/>
+        <a:font script="Khmr" typeface="DaunPenh"/>
+        <a:font script="Knda" typeface="Tunga"/>
+        <a:font script="Guru" typeface="Raavi"/>
+        <a:font script="Cans" typeface="Euphemia"/>
+        <a:font script="Cher" typeface="Plantagenet Cherokee"/>
+        <a:font script="Yiii" typeface="Microsoft Yi Baiti"/>
+        <a:font script="Tibt" typeface="Microsoft Himalaya"/>
+        <a:font script="Thaa" typeface="MV Boli"/>
+        <a:font script="Deva" typeface="Mangal"/>
+        <a:font script="Telu" typeface="Gautami"/>
+        <a:font script="Taml" typeface="Latha"/>
+        <a:font script="Syrc" typeface="Estrangelo Edessa"/>
+        <a:font script="Orya" typeface="Kalinga"/>
+        <a:font script="Mlym" typeface="Kartika"/>
+        <a:font script="Laoo" typeface="DokChampa"/>
+        <a:font script="Sinh" typeface="Iskoola Pota"/>
+        <a:font script="Mong" typeface="Mongolian Baiti"/>
+        <a:font script="Viet" typeface="Arial"/>
+        <a:font script="Uigh" typeface="Microsoft Uighur"/>
+        <a:font script="Geor" typeface="Sylfaen"/>
+      </a:minorFont>
+    </a:fontScheme>
+    <a:fmtScheme name="Office">
+      <a:fillStyleLst>
+        <a:solidFill>
+          <a:schemeClr val="phClr"/>
+        </a:solidFill>
+        <a:gradFill rotWithShape="1">
+          <a:gsLst>
+            <a:gs pos="0">
+              <a:schemeClr val="phClr">
+                <a:lumMod val="110000"/>
+                <a:satMod val="105000"/>
+                <a:tint val="67000"/>
+              </a:schemeClr>
+            </a:gs>
+            <a:gs pos="50000">
+              <a:schemeClr val="phClr">
+                <a:lumMod val="105000"/>
+                <a:satMod val="103000"/>
+                <a:tint val="73000"/>
+              </a:schemeClr>
+            </a:gs>
+            <a:gs pos="100000">
+              <a:schemeClr val="phClr">
+                <a:lumMod val="105000"/>
+                <a:satMod val="109000"/>
+                <a:tint val="81000"/>
+              </a:schemeClr>
+            </a:gs>
+          </a:gsLst>
+          <a:lin ang="5400000" scaled="0"/>
+        </a:gradFill>
+        <a:gradFill rotWithShape="1">
+          <a:gsLst>
+            <a:gs pos="0">
+              <a:schemeClr val="phClr">
+                <a:satMod val="103000"/>
+                <a:lumMod val="102000"/>
+                <a:tint val="94000"/>
+              </a:schemeClr>
+            </a:gs>
+            <a:gs pos="50000">
+              <a:schemeClr val="phClr">
+                <a:satMod val="110000"/>
+                <a:lumMod val="100000"/>
+                <a:shade val="100000"/>
+              </a:schemeClr>
+            </a:gs>
+            <a:gs pos="100000">
+              <a:schemeClr val="phClr">
+                <a:lumMod val="99000"/>
+                <a:satMod val="120000"/>
+                <a:shade val="78000"/>
+              </a:schemeClr>
+            </a:gs>
+          </a:gsLst>
+          <a:lin ang="5400000" scaled="0"/>
+        </a:gradFill>
+      </a:fillStyleLst>
+      <a:lnStyleLst>
+        <a:ln w="6350" cap="flat" cmpd="sng" algn="ctr">
+          <a:solidFill>
+            <a:schemeClr val="phClr"/>
+          </a:solidFill>
+          <a:prstDash val="solid"/>
+          <a:miter lim="800000"/>
+        </a:ln>
+        <a:ln w="12700" cap="flat" cmpd="sng" algn="ctr">
+          <a:solidFill>
+            <a:schemeClr val="phClr"/>
+          </a:solidFill>
+          <a:prstDash val="solid"/>
+          <a:miter lim="800000"/>
+        </a:ln>
+        <a:ln w="19050" cap="flat" cmpd="sng" algn="ctr">
+          <a:solidFill>
+            <a:schemeClr val="phClr"/>
+          </a:solidFill>
+          <a:prstDash val="solid"/>
+          <a:miter lim="800000"/>
+        </a:ln>
+      </a:lnStyleLst>
+      <a:effectStyleLst>
+        <a:effectStyle>
+          <a:effectLst/>
+        </a:effectStyle>
+        <a:effectStyle>
+          <a:effectLst/>
+        </a:effectStyle>
+        <a:effectStyle>
+          <a:effectLst>
+            <a:outerShdw blurRad="57150" dist="19050" dir="5400000" algn="ctr" rotWithShape="0">
+              <a:srgbClr val="000000">
+                <a:alpha val="63000"/>
+              </a:srgbClr>
+            </a:outerShdw>
+          </a:effectLst>
+        </a:effectStyle>
+      </a:effectStyleLst>
+      <a:bgFillStyleLst>
+        <a:solidFill>
+          <a:schemeClr val="phClr"/>
+        </a:solidFill>
+        <a:solidFill>
+          <a:schemeClr val="phClr">
+            <a:tint val="95000"/>
+            <a:satMod val="170000"/>
+          </a:schemeClr>
+        </a:solidFill>
+        <a:gradFill rotWithShape="1">
+          <a:gsLst>
+            <a:gs pos="0">
+              <a:schemeClr val="phClr">
+                <a:tint val="93000"/>
+                <a:satMod val="150000"/>
+                <a:shade val="98000"/>
+                <a:lumMod val="102000"/>
+              </a:schemeClr>
+            </a:gs>
+            <a:gs pos="50000">
+              <a:schemeClr val="phClr">
+                <a:tint val="98000"/>
+                <a:satMod val="130000"/>
+                <a:shade val="90000"/>
+                <a:lumMod val="103000"/>
+              </a:schemeClr>
+            </a:gs>
+            <a:gs pos="100000">
+              <a:schemeClr val="phClr">
+                <a:shade val="63000"/>
+                <a:satMod val="120000"/>
+              </a:schemeClr>
+            </a:gs>
+          </a:gsLst>
+          <a:lin ang="5400000" scaled="0"/>
+        </a:gradFill>
+      </a:bgFillStyleLst>
+    </a:fmtScheme>
+  </a:themeElements>
+  <a:objectDefaults/>
+  <a:extraClrSchemeLst/>
+  <a:extLst>
+    <a:ext uri="{05A4C25C-085E-4340-85A3-A5531E510DB2}">
+      <thm15:themeFamily xmlns:thm15="http://schemas.microsoft.com/office/thememl/2012/main" name="Office Theme" id="{62F939B6-93AF-4DB8-9C6B-D6C7DFDC589F}" vid="{4A3C46E8-61CC-4603-A589-7422A47A8E4A}"/>
+    </a:ext>
+  </a:extLst>
+</a:theme>
 </file>
</xml_diff>